<commit_message>
Små förbättringar på examinationsuppgiften
</commit_message>
<xml_diff>
--- a/examination/perh-ledar-A3.pptx
+++ b/examination/perh-ledar-A3.pptx
@@ -624,8 +624,8 @@
         </p:nvSpPr>
         <p:spPr>
           <a:xfrm>
-            <a:off x="4414519" y="6567160"/>
-            <a:ext cx="3769362" cy="248306"/>
+            <a:off x="4414520" y="6567160"/>
+            <a:ext cx="3769360" cy="248306"/>
           </a:xfrm>
           <a:prstGeom prst="rect">
             <a:avLst/>
@@ -2101,7 +2101,7 @@
         <p:spPr>
           <a:xfrm>
             <a:off x="369888" y="1388775"/>
-            <a:ext cx="11438113" cy="1"/>
+            <a:ext cx="11438112" cy="1"/>
           </a:xfrm>
           <a:prstGeom prst="line">
             <a:avLst/>
@@ -2129,7 +2129,7 @@
         </p:nvSpPr>
         <p:spPr>
           <a:xfrm>
-            <a:off x="11802264" y="2"/>
+            <a:off x="11802265" y="2"/>
             <a:ext cx="1" cy="301538"/>
           </a:xfrm>
           <a:prstGeom prst="line">
@@ -2525,7 +2525,7 @@
         <p:spPr>
           <a:xfrm>
             <a:off x="369888" y="1388775"/>
-            <a:ext cx="11438113" cy="1"/>
+            <a:ext cx="11438112" cy="1"/>
           </a:xfrm>
           <a:prstGeom prst="line">
             <a:avLst/>
@@ -2777,7 +2777,7 @@
         <p:spPr>
           <a:xfrm>
             <a:off x="369888" y="1388775"/>
-            <a:ext cx="11438113" cy="1"/>
+            <a:ext cx="11438112" cy="1"/>
           </a:xfrm>
           <a:prstGeom prst="line">
             <a:avLst/>
@@ -2805,7 +2805,7 @@
         </p:nvSpPr>
         <p:spPr>
           <a:xfrm>
-            <a:off x="11802264" y="2"/>
+            <a:off x="11802265" y="2"/>
             <a:ext cx="1" cy="301538"/>
           </a:xfrm>
           <a:prstGeom prst="line">
@@ -3214,7 +3214,7 @@
         <p:spPr>
           <a:xfrm>
             <a:off x="369888" y="1388775"/>
-            <a:ext cx="11438113" cy="1"/>
+            <a:ext cx="11438112" cy="1"/>
           </a:xfrm>
           <a:prstGeom prst="line">
             <a:avLst/>
@@ -3242,7 +3242,7 @@
         </p:nvSpPr>
         <p:spPr>
           <a:xfrm>
-            <a:off x="11802264" y="2"/>
+            <a:off x="11802265" y="2"/>
             <a:ext cx="1" cy="301538"/>
           </a:xfrm>
           <a:prstGeom prst="line">
@@ -3509,7 +3509,7 @@
         <p:spPr>
           <a:xfrm>
             <a:off x="369888" y="1388775"/>
-            <a:ext cx="11438113" cy="1"/>
+            <a:ext cx="11438112" cy="1"/>
           </a:xfrm>
           <a:prstGeom prst="line">
             <a:avLst/>
@@ -3537,7 +3537,7 @@
         </p:nvSpPr>
         <p:spPr>
           <a:xfrm>
-            <a:off x="11802264" y="2"/>
+            <a:off x="11802265" y="2"/>
             <a:ext cx="1" cy="301538"/>
           </a:xfrm>
           <a:prstGeom prst="line">
@@ -3831,7 +3831,7 @@
         <p:spPr>
           <a:xfrm>
             <a:off x="369888" y="1388775"/>
-            <a:ext cx="11438113" cy="1"/>
+            <a:ext cx="11438112" cy="1"/>
           </a:xfrm>
           <a:prstGeom prst="line">
             <a:avLst/>
@@ -3859,7 +3859,7 @@
         </p:nvSpPr>
         <p:spPr>
           <a:xfrm>
-            <a:off x="11802264" y="2"/>
+            <a:off x="11802265" y="2"/>
             <a:ext cx="1" cy="301538"/>
           </a:xfrm>
           <a:prstGeom prst="line">
@@ -4295,7 +4295,7 @@
         <p:spPr>
           <a:xfrm>
             <a:off x="369888" y="1388775"/>
-            <a:ext cx="11438113" cy="1"/>
+            <a:ext cx="11438112" cy="1"/>
           </a:xfrm>
           <a:prstGeom prst="line">
             <a:avLst/>
@@ -4323,7 +4323,7 @@
         </p:nvSpPr>
         <p:spPr>
           <a:xfrm>
-            <a:off x="11802264" y="2"/>
+            <a:off x="11802265" y="2"/>
             <a:ext cx="1" cy="301538"/>
           </a:xfrm>
           <a:prstGeom prst="line">
@@ -4759,7 +4759,7 @@
         <p:spPr>
           <a:xfrm>
             <a:off x="369888" y="1388775"/>
-            <a:ext cx="11438113" cy="1"/>
+            <a:ext cx="11438112" cy="1"/>
           </a:xfrm>
           <a:prstGeom prst="line">
             <a:avLst/>
@@ -4787,7 +4787,7 @@
         </p:nvSpPr>
         <p:spPr>
           <a:xfrm>
-            <a:off x="11802264" y="2"/>
+            <a:off x="11802265" y="2"/>
             <a:ext cx="1" cy="301538"/>
           </a:xfrm>
           <a:prstGeom prst="line">
@@ -5237,7 +5237,7 @@
         <p:spPr>
           <a:xfrm>
             <a:off x="369888" y="1388775"/>
-            <a:ext cx="11438113" cy="1"/>
+            <a:ext cx="11438112" cy="1"/>
           </a:xfrm>
           <a:prstGeom prst="line">
             <a:avLst/>
@@ -5265,7 +5265,7 @@
         </p:nvSpPr>
         <p:spPr>
           <a:xfrm>
-            <a:off x="11802264" y="2"/>
+            <a:off x="11802265" y="2"/>
             <a:ext cx="1" cy="301538"/>
           </a:xfrm>
           <a:prstGeom prst="line">
@@ -5701,7 +5701,7 @@
         <p:spPr>
           <a:xfrm>
             <a:off x="369888" y="1388775"/>
-            <a:ext cx="11438113" cy="1"/>
+            <a:ext cx="11438112" cy="1"/>
           </a:xfrm>
           <a:prstGeom prst="line">
             <a:avLst/>
@@ -5729,7 +5729,7 @@
         </p:nvSpPr>
         <p:spPr>
           <a:xfrm>
-            <a:off x="11802264" y="2"/>
+            <a:off x="11802265" y="2"/>
             <a:ext cx="1" cy="301538"/>
           </a:xfrm>
           <a:prstGeom prst="line">
@@ -6165,7 +6165,7 @@
         <p:spPr>
           <a:xfrm>
             <a:off x="369888" y="1388775"/>
-            <a:ext cx="11438113" cy="1"/>
+            <a:ext cx="11438112" cy="1"/>
           </a:xfrm>
           <a:prstGeom prst="line">
             <a:avLst/>
@@ -6193,7 +6193,7 @@
         </p:nvSpPr>
         <p:spPr>
           <a:xfrm>
-            <a:off x="11802264" y="2"/>
+            <a:off x="11802265" y="2"/>
             <a:ext cx="1" cy="301538"/>
           </a:xfrm>
           <a:prstGeom prst="line">
@@ -6602,7 +6602,7 @@
         <p:spPr>
           <a:xfrm>
             <a:off x="369888" y="1388775"/>
-            <a:ext cx="11438113" cy="1"/>
+            <a:ext cx="11438112" cy="1"/>
           </a:xfrm>
           <a:prstGeom prst="line">
             <a:avLst/>
@@ -6630,7 +6630,7 @@
         </p:nvSpPr>
         <p:spPr>
           <a:xfrm>
-            <a:off x="11802264" y="2"/>
+            <a:off x="11802265" y="2"/>
             <a:ext cx="1" cy="301538"/>
           </a:xfrm>
           <a:prstGeom prst="line">
@@ -7237,7 +7237,7 @@
         <p:spPr>
           <a:xfrm>
             <a:off x="369888" y="1388775"/>
-            <a:ext cx="11438113" cy="1"/>
+            <a:ext cx="11438112" cy="1"/>
           </a:xfrm>
           <a:prstGeom prst="line">
             <a:avLst/>
@@ -7265,7 +7265,7 @@
         </p:nvSpPr>
         <p:spPr>
           <a:xfrm>
-            <a:off x="11802264" y="2"/>
+            <a:off x="11802265" y="2"/>
             <a:ext cx="1" cy="301538"/>
           </a:xfrm>
           <a:prstGeom prst="line">
@@ -7728,7 +7728,7 @@
         <p:spPr>
           <a:xfrm>
             <a:off x="369888" y="1388775"/>
-            <a:ext cx="11438113" cy="1"/>
+            <a:ext cx="11438112" cy="1"/>
           </a:xfrm>
           <a:prstGeom prst="line">
             <a:avLst/>
@@ -7756,7 +7756,7 @@
         </p:nvSpPr>
         <p:spPr>
           <a:xfrm>
-            <a:off x="11802264" y="2"/>
+            <a:off x="11802265" y="2"/>
             <a:ext cx="1" cy="301538"/>
           </a:xfrm>
           <a:prstGeom prst="line">
@@ -8219,7 +8219,7 @@
         <p:spPr>
           <a:xfrm>
             <a:off x="369888" y="1388775"/>
-            <a:ext cx="11438113" cy="1"/>
+            <a:ext cx="11438112" cy="1"/>
           </a:xfrm>
           <a:prstGeom prst="line">
             <a:avLst/>
@@ -8247,7 +8247,7 @@
         </p:nvSpPr>
         <p:spPr>
           <a:xfrm>
-            <a:off x="11802264" y="2"/>
+            <a:off x="11802265" y="2"/>
             <a:ext cx="1" cy="301538"/>
           </a:xfrm>
           <a:prstGeom prst="line">
@@ -8737,7 +8737,7 @@
         <p:spPr>
           <a:xfrm>
             <a:off x="369888" y="1388775"/>
-            <a:ext cx="11438113" cy="1"/>
+            <a:ext cx="11438112" cy="1"/>
           </a:xfrm>
           <a:prstGeom prst="line">
             <a:avLst/>
@@ -8765,7 +8765,7 @@
         </p:nvSpPr>
         <p:spPr>
           <a:xfrm>
-            <a:off x="11802264" y="2"/>
+            <a:off x="11802265" y="2"/>
             <a:ext cx="1" cy="301538"/>
           </a:xfrm>
           <a:prstGeom prst="line">
@@ -9273,7 +9273,7 @@
         <p:spPr>
           <a:xfrm>
             <a:off x="369888" y="1388775"/>
-            <a:ext cx="11438113" cy="1"/>
+            <a:ext cx="11438112" cy="1"/>
           </a:xfrm>
           <a:prstGeom prst="line">
             <a:avLst/>
@@ -9301,7 +9301,7 @@
         </p:nvSpPr>
         <p:spPr>
           <a:xfrm>
-            <a:off x="11802264" y="2"/>
+            <a:off x="11802265" y="2"/>
             <a:ext cx="1" cy="301538"/>
           </a:xfrm>
           <a:prstGeom prst="line">
@@ -9677,7 +9677,7 @@
         <p:spPr>
           <a:xfrm>
             <a:off x="369888" y="1388775"/>
-            <a:ext cx="11438113" cy="1"/>
+            <a:ext cx="11438112" cy="1"/>
           </a:xfrm>
           <a:prstGeom prst="line">
             <a:avLst/>
@@ -9809,7 +9809,7 @@
         <p:spPr>
           <a:xfrm>
             <a:off x="369888" y="1388775"/>
-            <a:ext cx="11438113" cy="1"/>
+            <a:ext cx="11438112" cy="1"/>
           </a:xfrm>
           <a:prstGeom prst="line">
             <a:avLst/>
@@ -9837,7 +9837,7 @@
         </p:nvSpPr>
         <p:spPr>
           <a:xfrm>
-            <a:off x="11802264" y="2"/>
+            <a:off x="11802265" y="2"/>
             <a:ext cx="1" cy="301538"/>
           </a:xfrm>
           <a:prstGeom prst="line">
@@ -10246,7 +10246,7 @@
         <p:spPr>
           <a:xfrm>
             <a:off x="369888" y="1388775"/>
-            <a:ext cx="11438113" cy="1"/>
+            <a:ext cx="11438112" cy="1"/>
           </a:xfrm>
           <a:prstGeom prst="line">
             <a:avLst/>
@@ -10274,7 +10274,7 @@
         </p:nvSpPr>
         <p:spPr>
           <a:xfrm>
-            <a:off x="11802264" y="2"/>
+            <a:off x="11802265" y="2"/>
             <a:ext cx="1" cy="301538"/>
           </a:xfrm>
           <a:prstGeom prst="line">
@@ -10612,7 +10612,7 @@
         <p:spPr>
           <a:xfrm>
             <a:off x="-1685365" y="-1169894"/>
-            <a:ext cx="8337179" cy="6158754"/>
+            <a:ext cx="8337178" cy="6158754"/>
           </a:xfrm>
           <a:prstGeom prst="ellipse">
             <a:avLst/>
@@ -10838,8 +10838,8 @@
         </p:nvSpPr>
         <p:spPr>
           <a:xfrm>
-            <a:off x="12233851" y="-27178000"/>
-            <a:ext cx="64440284" cy="61468000"/>
+            <a:off x="12233850" y="-27178000"/>
+            <a:ext cx="64440285" cy="61468000"/>
           </a:xfrm>
           <a:prstGeom prst="rect">
             <a:avLst/>
@@ -10877,7 +10877,7 @@
         </p:nvSpPr>
         <p:spPr>
           <a:xfrm>
-            <a:off x="-61853218" y="-27178000"/>
+            <a:off x="-61853217" y="-27178000"/>
             <a:ext cx="61811750" cy="61468000"/>
           </a:xfrm>
           <a:prstGeom prst="rect">
@@ -10916,8 +10916,8 @@
         </p:nvSpPr>
         <p:spPr>
           <a:xfrm>
-            <a:off x="-5328191" y="6885989"/>
-            <a:ext cx="20278150" cy="26241605"/>
+            <a:off x="-5328190" y="6885989"/>
+            <a:ext cx="20278149" cy="26241606"/>
           </a:xfrm>
           <a:prstGeom prst="rect">
             <a:avLst/>
@@ -10955,8 +10955,8 @@
         </p:nvSpPr>
         <p:spPr>
           <a:xfrm>
-            <a:off x="-5328191" y="-27196275"/>
-            <a:ext cx="20278150" cy="27178001"/>
+            <a:off x="-5328190" y="-27196275"/>
+            <a:ext cx="20278149" cy="27178001"/>
           </a:xfrm>
           <a:prstGeom prst="rect">
             <a:avLst/>
@@ -11126,7 +11126,7 @@
         </p:nvSpPr>
         <p:spPr>
           <a:xfrm>
-            <a:off x="-61840537" y="-27178000"/>
+            <a:off x="-61840536" y="-27178000"/>
             <a:ext cx="61811751" cy="61468000"/>
           </a:xfrm>
           <a:prstGeom prst="rect">
@@ -11165,8 +11165,8 @@
         </p:nvSpPr>
         <p:spPr>
           <a:xfrm>
-            <a:off x="-5328191" y="-27196275"/>
-            <a:ext cx="20278150" cy="27178001"/>
+            <a:off x="-5328190" y="-27196275"/>
+            <a:ext cx="20278149" cy="27178001"/>
           </a:xfrm>
           <a:prstGeom prst="rect">
             <a:avLst/>
@@ -11204,8 +11204,8 @@
         </p:nvSpPr>
         <p:spPr>
           <a:xfrm>
-            <a:off x="-5328191" y="6885989"/>
-            <a:ext cx="20278150" cy="26241605"/>
+            <a:off x="-5328190" y="6885989"/>
+            <a:ext cx="20278149" cy="26241606"/>
           </a:xfrm>
           <a:prstGeom prst="rect">
             <a:avLst/>
@@ -11695,7 +11695,7 @@
         </p:nvSpPr>
         <p:spPr>
           <a:xfrm>
-            <a:off x="-61840537" y="-27178000"/>
+            <a:off x="-61840536" y="-27178000"/>
             <a:ext cx="61811751" cy="61468000"/>
           </a:xfrm>
           <a:prstGeom prst="rect">
@@ -11734,8 +11734,8 @@
         </p:nvSpPr>
         <p:spPr>
           <a:xfrm>
-            <a:off x="-5328191" y="-27196275"/>
-            <a:ext cx="20278150" cy="27178001"/>
+            <a:off x="-5328190" y="-27196275"/>
+            <a:ext cx="20278149" cy="27178001"/>
           </a:xfrm>
           <a:prstGeom prst="rect">
             <a:avLst/>
@@ -11773,8 +11773,8 @@
         </p:nvSpPr>
         <p:spPr>
           <a:xfrm>
-            <a:off x="-5328191" y="6885989"/>
-            <a:ext cx="20278150" cy="26241605"/>
+            <a:off x="-5328190" y="6885989"/>
+            <a:ext cx="20278149" cy="26241606"/>
           </a:xfrm>
           <a:prstGeom prst="rect">
             <a:avLst/>
@@ -12109,7 +12109,7 @@
         </p:nvSpPr>
         <p:spPr>
           <a:xfrm>
-            <a:off x="-61840537" y="-27178000"/>
+            <a:off x="-61840536" y="-27178000"/>
             <a:ext cx="61811751" cy="61468000"/>
           </a:xfrm>
           <a:prstGeom prst="rect">
@@ -12148,8 +12148,8 @@
         </p:nvSpPr>
         <p:spPr>
           <a:xfrm>
-            <a:off x="-5328191" y="-27196275"/>
-            <a:ext cx="20278150" cy="27178001"/>
+            <a:off x="-5328190" y="-27196275"/>
+            <a:ext cx="20278149" cy="27178001"/>
           </a:xfrm>
           <a:prstGeom prst="rect">
             <a:avLst/>
@@ -12187,8 +12187,8 @@
         </p:nvSpPr>
         <p:spPr>
           <a:xfrm>
-            <a:off x="-5328191" y="6885989"/>
-            <a:ext cx="20278150" cy="26241605"/>
+            <a:off x="-5328190" y="6885989"/>
+            <a:ext cx="20278149" cy="26241606"/>
           </a:xfrm>
           <a:prstGeom prst="rect">
             <a:avLst/>
@@ -12523,7 +12523,7 @@
         </p:nvSpPr>
         <p:spPr>
           <a:xfrm>
-            <a:off x="-61840537" y="-27178000"/>
+            <a:off x="-61840536" y="-27178000"/>
             <a:ext cx="61811751" cy="61468000"/>
           </a:xfrm>
           <a:prstGeom prst="rect">
@@ -12562,8 +12562,8 @@
         </p:nvSpPr>
         <p:spPr>
           <a:xfrm>
-            <a:off x="-5328191" y="-27196275"/>
-            <a:ext cx="20278150" cy="27178001"/>
+            <a:off x="-5328190" y="-27196275"/>
+            <a:ext cx="20278149" cy="27178001"/>
           </a:xfrm>
           <a:prstGeom prst="rect">
             <a:avLst/>
@@ -12601,8 +12601,8 @@
         </p:nvSpPr>
         <p:spPr>
           <a:xfrm>
-            <a:off x="-5328191" y="6885989"/>
-            <a:ext cx="20278150" cy="26241605"/>
+            <a:off x="-5328190" y="6885989"/>
+            <a:ext cx="20278149" cy="26241606"/>
           </a:xfrm>
           <a:prstGeom prst="rect">
             <a:avLst/>
@@ -12937,7 +12937,7 @@
         </p:nvSpPr>
         <p:spPr>
           <a:xfrm>
-            <a:off x="-61840537" y="-27178000"/>
+            <a:off x="-61840536" y="-27178000"/>
             <a:ext cx="61811751" cy="61468000"/>
           </a:xfrm>
           <a:prstGeom prst="rect">
@@ -12976,8 +12976,8 @@
         </p:nvSpPr>
         <p:spPr>
           <a:xfrm>
-            <a:off x="-5328191" y="-27196275"/>
-            <a:ext cx="20278150" cy="27178001"/>
+            <a:off x="-5328190" y="-27196275"/>
+            <a:ext cx="20278149" cy="27178001"/>
           </a:xfrm>
           <a:prstGeom prst="rect">
             <a:avLst/>
@@ -13015,8 +13015,8 @@
         </p:nvSpPr>
         <p:spPr>
           <a:xfrm>
-            <a:off x="-5328191" y="6885989"/>
-            <a:ext cx="20278150" cy="26241605"/>
+            <a:off x="-5328190" y="6885989"/>
+            <a:ext cx="20278149" cy="26241606"/>
           </a:xfrm>
           <a:prstGeom prst="rect">
             <a:avLst/>
@@ -13378,7 +13378,7 @@
         </p:nvSpPr>
         <p:spPr>
           <a:xfrm>
-            <a:off x="-61840537" y="-27178000"/>
+            <a:off x="-61840536" y="-27178000"/>
             <a:ext cx="61811751" cy="61468000"/>
           </a:xfrm>
           <a:prstGeom prst="rect">
@@ -13417,8 +13417,8 @@
         </p:nvSpPr>
         <p:spPr>
           <a:xfrm>
-            <a:off x="-5328191" y="-27196275"/>
-            <a:ext cx="20278150" cy="27178001"/>
+            <a:off x="-5328190" y="-27196275"/>
+            <a:ext cx="20278149" cy="27178001"/>
           </a:xfrm>
           <a:prstGeom prst="rect">
             <a:avLst/>
@@ -13456,8 +13456,8 @@
         </p:nvSpPr>
         <p:spPr>
           <a:xfrm>
-            <a:off x="-5328191" y="6885989"/>
-            <a:ext cx="20278150" cy="26241605"/>
+            <a:off x="-5328190" y="6885989"/>
+            <a:ext cx="20278149" cy="26241606"/>
           </a:xfrm>
           <a:prstGeom prst="rect">
             <a:avLst/>
@@ -13819,7 +13819,7 @@
         </p:nvSpPr>
         <p:spPr>
           <a:xfrm>
-            <a:off x="-61840537" y="-27178000"/>
+            <a:off x="-61840536" y="-27178000"/>
             <a:ext cx="61811751" cy="61468000"/>
           </a:xfrm>
           <a:prstGeom prst="rect">
@@ -13858,8 +13858,8 @@
         </p:nvSpPr>
         <p:spPr>
           <a:xfrm>
-            <a:off x="-5328191" y="-27196275"/>
-            <a:ext cx="20278150" cy="27178001"/>
+            <a:off x="-5328190" y="-27196275"/>
+            <a:ext cx="20278149" cy="27178001"/>
           </a:xfrm>
           <a:prstGeom prst="rect">
             <a:avLst/>
@@ -13897,8 +13897,8 @@
         </p:nvSpPr>
         <p:spPr>
           <a:xfrm>
-            <a:off x="-5328191" y="6885989"/>
-            <a:ext cx="20278150" cy="26241605"/>
+            <a:off x="-5328190" y="6885989"/>
+            <a:ext cx="20278149" cy="26241606"/>
           </a:xfrm>
           <a:prstGeom prst="rect">
             <a:avLst/>
@@ -14260,7 +14260,7 @@
         </p:nvSpPr>
         <p:spPr>
           <a:xfrm>
-            <a:off x="-61840537" y="-27178000"/>
+            <a:off x="-61840536" y="-27178000"/>
             <a:ext cx="61811751" cy="61468000"/>
           </a:xfrm>
           <a:prstGeom prst="rect">
@@ -14299,8 +14299,8 @@
         </p:nvSpPr>
         <p:spPr>
           <a:xfrm>
-            <a:off x="-5328191" y="-27196275"/>
-            <a:ext cx="20278150" cy="27178001"/>
+            <a:off x="-5328190" y="-27196275"/>
+            <a:ext cx="20278149" cy="27178001"/>
           </a:xfrm>
           <a:prstGeom prst="rect">
             <a:avLst/>
@@ -14338,8 +14338,8 @@
         </p:nvSpPr>
         <p:spPr>
           <a:xfrm>
-            <a:off x="-5328191" y="6885989"/>
-            <a:ext cx="20278150" cy="26241605"/>
+            <a:off x="-5328190" y="6885989"/>
+            <a:ext cx="20278149" cy="26241606"/>
           </a:xfrm>
           <a:prstGeom prst="rect">
             <a:avLst/>
@@ -14701,7 +14701,7 @@
         </p:nvSpPr>
         <p:spPr>
           <a:xfrm>
-            <a:off x="-61840537" y="-27178000"/>
+            <a:off x="-61840536" y="-27178000"/>
             <a:ext cx="61811751" cy="61468000"/>
           </a:xfrm>
           <a:prstGeom prst="rect">
@@ -14740,8 +14740,8 @@
         </p:nvSpPr>
         <p:spPr>
           <a:xfrm>
-            <a:off x="-5328191" y="-27196275"/>
-            <a:ext cx="20278150" cy="27178001"/>
+            <a:off x="-5328190" y="-27196275"/>
+            <a:ext cx="20278149" cy="27178001"/>
           </a:xfrm>
           <a:prstGeom prst="rect">
             <a:avLst/>
@@ -14779,8 +14779,8 @@
         </p:nvSpPr>
         <p:spPr>
           <a:xfrm>
-            <a:off x="-5328191" y="6885989"/>
-            <a:ext cx="20278150" cy="26241605"/>
+            <a:off x="-5328190" y="6885989"/>
+            <a:ext cx="20278149" cy="26241606"/>
           </a:xfrm>
           <a:prstGeom prst="rect">
             <a:avLst/>
@@ -15142,7 +15142,7 @@
         </p:nvSpPr>
         <p:spPr>
           <a:xfrm>
-            <a:off x="-61840537" y="-27178000"/>
+            <a:off x="-61840536" y="-27178000"/>
             <a:ext cx="61811751" cy="61468000"/>
           </a:xfrm>
           <a:prstGeom prst="rect">
@@ -15181,8 +15181,8 @@
         </p:nvSpPr>
         <p:spPr>
           <a:xfrm>
-            <a:off x="-5328191" y="-27196275"/>
-            <a:ext cx="20278150" cy="27178001"/>
+            <a:off x="-5328190" y="-27196275"/>
+            <a:ext cx="20278149" cy="27178001"/>
           </a:xfrm>
           <a:prstGeom prst="rect">
             <a:avLst/>
@@ -15220,8 +15220,8 @@
         </p:nvSpPr>
         <p:spPr>
           <a:xfrm>
-            <a:off x="-5328191" y="6885989"/>
-            <a:ext cx="20278150" cy="26241605"/>
+            <a:off x="-5328190" y="6885989"/>
+            <a:ext cx="20278149" cy="26241606"/>
           </a:xfrm>
           <a:prstGeom prst="rect">
             <a:avLst/>
@@ -15428,7 +15428,7 @@
         </p:nvSpPr>
         <p:spPr>
           <a:xfrm>
-            <a:off x="-61840537" y="-27178000"/>
+            <a:off x="-61840536" y="-27178000"/>
             <a:ext cx="61811751" cy="61468000"/>
           </a:xfrm>
           <a:prstGeom prst="rect">
@@ -15467,8 +15467,8 @@
         </p:nvSpPr>
         <p:spPr>
           <a:xfrm>
-            <a:off x="-5328191" y="-27196275"/>
-            <a:ext cx="20278150" cy="27178001"/>
+            <a:off x="-5328190" y="-27196275"/>
+            <a:ext cx="20278149" cy="27178001"/>
           </a:xfrm>
           <a:prstGeom prst="rect">
             <a:avLst/>
@@ -15506,8 +15506,8 @@
         </p:nvSpPr>
         <p:spPr>
           <a:xfrm>
-            <a:off x="-5328191" y="6885989"/>
-            <a:ext cx="20278150" cy="26241605"/>
+            <a:off x="-5328190" y="6885989"/>
+            <a:ext cx="20278149" cy="26241606"/>
           </a:xfrm>
           <a:prstGeom prst="rect">
             <a:avLst/>
@@ -15813,7 +15813,7 @@
         <p:spPr>
           <a:xfrm>
             <a:off x="-1685365" y="-1169894"/>
-            <a:ext cx="8337179" cy="6158754"/>
+            <a:ext cx="8337178" cy="6158754"/>
           </a:xfrm>
           <a:prstGeom prst="ellipse">
             <a:avLst/>
@@ -15960,8 +15960,8 @@
         </p:nvSpPr>
         <p:spPr>
           <a:xfrm>
-            <a:off x="12233851" y="-27178000"/>
-            <a:ext cx="64440284" cy="61468000"/>
+            <a:off x="12233850" y="-27178000"/>
+            <a:ext cx="64440285" cy="61468000"/>
           </a:xfrm>
           <a:prstGeom prst="rect">
             <a:avLst/>
@@ -15999,7 +15999,7 @@
         </p:nvSpPr>
         <p:spPr>
           <a:xfrm>
-            <a:off x="-61840537" y="-27178000"/>
+            <a:off x="-61840536" y="-27178000"/>
             <a:ext cx="61811751" cy="61468000"/>
           </a:xfrm>
           <a:prstGeom prst="rect">
@@ -16038,8 +16038,8 @@
         </p:nvSpPr>
         <p:spPr>
           <a:xfrm>
-            <a:off x="-5328191" y="-27194728"/>
-            <a:ext cx="20278150" cy="27178001"/>
+            <a:off x="-5328190" y="-27194728"/>
+            <a:ext cx="20278149" cy="27178001"/>
           </a:xfrm>
           <a:prstGeom prst="rect">
             <a:avLst/>
@@ -16077,8 +16077,8 @@
         </p:nvSpPr>
         <p:spPr>
           <a:xfrm>
-            <a:off x="-5328191" y="6885989"/>
-            <a:ext cx="20278150" cy="26241605"/>
+            <a:off x="-5328190" y="6885989"/>
+            <a:ext cx="20278149" cy="26241606"/>
           </a:xfrm>
           <a:prstGeom prst="rect">
             <a:avLst/>
@@ -16249,7 +16249,7 @@
         <p:spPr>
           <a:xfrm>
             <a:off x="369888" y="1388775"/>
-            <a:ext cx="11438113" cy="1"/>
+            <a:ext cx="11438112" cy="1"/>
           </a:xfrm>
           <a:prstGeom prst="line">
             <a:avLst/>
@@ -16277,7 +16277,7 @@
         </p:nvSpPr>
         <p:spPr>
           <a:xfrm>
-            <a:off x="11802264" y="6"/>
+            <a:off x="11802265" y="6"/>
             <a:ext cx="1" cy="301538"/>
           </a:xfrm>
           <a:prstGeom prst="line">
@@ -16673,7 +16673,7 @@
         <p:spPr>
           <a:xfrm>
             <a:off x="369888" y="1388775"/>
-            <a:ext cx="11438113" cy="1"/>
+            <a:ext cx="11438112" cy="1"/>
           </a:xfrm>
           <a:prstGeom prst="line">
             <a:avLst/>
@@ -16805,7 +16805,7 @@
         <p:spPr>
           <a:xfrm>
             <a:off x="369888" y="1388775"/>
-            <a:ext cx="11438113" cy="1"/>
+            <a:ext cx="11438112" cy="1"/>
           </a:xfrm>
           <a:prstGeom prst="line">
             <a:avLst/>
@@ -16833,7 +16833,7 @@
         </p:nvSpPr>
         <p:spPr>
           <a:xfrm>
-            <a:off x="11802264" y="6"/>
+            <a:off x="11802265" y="6"/>
             <a:ext cx="1" cy="301538"/>
           </a:xfrm>
           <a:prstGeom prst="line">
@@ -17242,7 +17242,7 @@
         <p:spPr>
           <a:xfrm>
             <a:off x="369888" y="1388775"/>
-            <a:ext cx="11438113" cy="1"/>
+            <a:ext cx="11438112" cy="1"/>
           </a:xfrm>
           <a:prstGeom prst="line">
             <a:avLst/>
@@ -17270,7 +17270,7 @@
         </p:nvSpPr>
         <p:spPr>
           <a:xfrm>
-            <a:off x="11802264" y="6"/>
+            <a:off x="11802265" y="6"/>
             <a:ext cx="1" cy="301538"/>
           </a:xfrm>
           <a:prstGeom prst="line">
@@ -17537,7 +17537,7 @@
         <p:spPr>
           <a:xfrm>
             <a:off x="369888" y="1388775"/>
-            <a:ext cx="11438113" cy="1"/>
+            <a:ext cx="11438112" cy="1"/>
           </a:xfrm>
           <a:prstGeom prst="line">
             <a:avLst/>
@@ -17565,7 +17565,7 @@
         </p:nvSpPr>
         <p:spPr>
           <a:xfrm>
-            <a:off x="11802264" y="6"/>
+            <a:off x="11802265" y="6"/>
             <a:ext cx="1" cy="301538"/>
           </a:xfrm>
           <a:prstGeom prst="line">
@@ -17859,7 +17859,7 @@
         <p:spPr>
           <a:xfrm>
             <a:off x="369888" y="1388775"/>
-            <a:ext cx="11438113" cy="1"/>
+            <a:ext cx="11438112" cy="1"/>
           </a:xfrm>
           <a:prstGeom prst="line">
             <a:avLst/>
@@ -17887,7 +17887,7 @@
         </p:nvSpPr>
         <p:spPr>
           <a:xfrm>
-            <a:off x="11802264" y="6"/>
+            <a:off x="11802265" y="6"/>
             <a:ext cx="1" cy="301538"/>
           </a:xfrm>
           <a:prstGeom prst="line">
@@ -18323,7 +18323,7 @@
         <p:spPr>
           <a:xfrm>
             <a:off x="369888" y="1388775"/>
-            <a:ext cx="11438113" cy="1"/>
+            <a:ext cx="11438112" cy="1"/>
           </a:xfrm>
           <a:prstGeom prst="line">
             <a:avLst/>
@@ -18351,7 +18351,7 @@
         </p:nvSpPr>
         <p:spPr>
           <a:xfrm>
-            <a:off x="11802264" y="6"/>
+            <a:off x="11802265" y="6"/>
             <a:ext cx="1" cy="301538"/>
           </a:xfrm>
           <a:prstGeom prst="line">
@@ -18787,7 +18787,7 @@
         <p:spPr>
           <a:xfrm>
             <a:off x="369888" y="1388775"/>
-            <a:ext cx="11438113" cy="1"/>
+            <a:ext cx="11438112" cy="1"/>
           </a:xfrm>
           <a:prstGeom prst="line">
             <a:avLst/>
@@ -18815,7 +18815,7 @@
         </p:nvSpPr>
         <p:spPr>
           <a:xfrm>
-            <a:off x="11802264" y="6"/>
+            <a:off x="11802265" y="6"/>
             <a:ext cx="1" cy="301538"/>
           </a:xfrm>
           <a:prstGeom prst="line">
@@ -19265,7 +19265,7 @@
         <p:spPr>
           <a:xfrm>
             <a:off x="369888" y="1388775"/>
-            <a:ext cx="11438113" cy="1"/>
+            <a:ext cx="11438112" cy="1"/>
           </a:xfrm>
           <a:prstGeom prst="line">
             <a:avLst/>
@@ -19293,7 +19293,7 @@
         </p:nvSpPr>
         <p:spPr>
           <a:xfrm>
-            <a:off x="11802264" y="6"/>
+            <a:off x="11802265" y="6"/>
             <a:ext cx="1" cy="301538"/>
           </a:xfrm>
           <a:prstGeom prst="line">
@@ -19729,7 +19729,7 @@
         <p:spPr>
           <a:xfrm>
             <a:off x="369888" y="1388775"/>
-            <a:ext cx="11438113" cy="1"/>
+            <a:ext cx="11438112" cy="1"/>
           </a:xfrm>
           <a:prstGeom prst="line">
             <a:avLst/>
@@ -19757,7 +19757,7 @@
         </p:nvSpPr>
         <p:spPr>
           <a:xfrm>
-            <a:off x="11802264" y="6"/>
+            <a:off x="11802265" y="6"/>
             <a:ext cx="1" cy="301538"/>
           </a:xfrm>
           <a:prstGeom prst="line">
@@ -20265,7 +20265,7 @@
         <p:spPr>
           <a:xfrm>
             <a:off x="369888" y="1388775"/>
-            <a:ext cx="11438113" cy="1"/>
+            <a:ext cx="11438112" cy="1"/>
           </a:xfrm>
           <a:prstGeom prst="line">
             <a:avLst/>
@@ -20293,7 +20293,7 @@
         </p:nvSpPr>
         <p:spPr>
           <a:xfrm>
-            <a:off x="11802264" y="6"/>
+            <a:off x="11802265" y="6"/>
             <a:ext cx="1" cy="301538"/>
           </a:xfrm>
           <a:prstGeom prst="line">
@@ -20702,7 +20702,7 @@
         <p:spPr>
           <a:xfrm>
             <a:off x="369888" y="1388775"/>
-            <a:ext cx="11438113" cy="1"/>
+            <a:ext cx="11438112" cy="1"/>
           </a:xfrm>
           <a:prstGeom prst="line">
             <a:avLst/>
@@ -20730,7 +20730,7 @@
         </p:nvSpPr>
         <p:spPr>
           <a:xfrm>
-            <a:off x="11802264" y="6"/>
+            <a:off x="11802265" y="6"/>
             <a:ext cx="1" cy="301538"/>
           </a:xfrm>
           <a:prstGeom prst="line">
@@ -21139,7 +21139,7 @@
         <p:spPr>
           <a:xfrm>
             <a:off x="369888" y="1388775"/>
-            <a:ext cx="11438113" cy="1"/>
+            <a:ext cx="11438112" cy="1"/>
           </a:xfrm>
           <a:prstGeom prst="line">
             <a:avLst/>
@@ -21167,7 +21167,7 @@
         </p:nvSpPr>
         <p:spPr>
           <a:xfrm>
-            <a:off x="11802264" y="6"/>
+            <a:off x="11802265" y="6"/>
             <a:ext cx="1" cy="301538"/>
           </a:xfrm>
           <a:prstGeom prst="line">
@@ -21630,7 +21630,7 @@
         <p:spPr>
           <a:xfrm>
             <a:off x="369888" y="1388775"/>
-            <a:ext cx="11438113" cy="1"/>
+            <a:ext cx="11438112" cy="1"/>
           </a:xfrm>
           <a:prstGeom prst="line">
             <a:avLst/>
@@ -21658,7 +21658,7 @@
         </p:nvSpPr>
         <p:spPr>
           <a:xfrm>
-            <a:off x="11802264" y="6"/>
+            <a:off x="11802265" y="6"/>
             <a:ext cx="1" cy="301538"/>
           </a:xfrm>
           <a:prstGeom prst="line">
@@ -22121,7 +22121,7 @@
         <p:spPr>
           <a:xfrm>
             <a:off x="369888" y="1388775"/>
-            <a:ext cx="11438113" cy="1"/>
+            <a:ext cx="11438112" cy="1"/>
           </a:xfrm>
           <a:prstGeom prst="line">
             <a:avLst/>
@@ -22149,7 +22149,7 @@
         </p:nvSpPr>
         <p:spPr>
           <a:xfrm>
-            <a:off x="11802264" y="6"/>
+            <a:off x="11802265" y="6"/>
             <a:ext cx="1" cy="301538"/>
           </a:xfrm>
           <a:prstGeom prst="line">
@@ -22639,7 +22639,7 @@
         <p:spPr>
           <a:xfrm>
             <a:off x="369888" y="1388775"/>
-            <a:ext cx="11438113" cy="1"/>
+            <a:ext cx="11438112" cy="1"/>
           </a:xfrm>
           <a:prstGeom prst="line">
             <a:avLst/>
@@ -22667,7 +22667,7 @@
         </p:nvSpPr>
         <p:spPr>
           <a:xfrm>
-            <a:off x="11802264" y="6"/>
+            <a:off x="11802265" y="6"/>
             <a:ext cx="1" cy="301538"/>
           </a:xfrm>
           <a:prstGeom prst="line">
@@ -23175,7 +23175,7 @@
         <p:spPr>
           <a:xfrm>
             <a:off x="369888" y="1388775"/>
-            <a:ext cx="11438113" cy="1"/>
+            <a:ext cx="11438112" cy="1"/>
           </a:xfrm>
           <a:prstGeom prst="line">
             <a:avLst/>
@@ -23203,7 +23203,7 @@
         </p:nvSpPr>
         <p:spPr>
           <a:xfrm>
-            <a:off x="11802264" y="6"/>
+            <a:off x="11802265" y="6"/>
             <a:ext cx="1" cy="301538"/>
           </a:xfrm>
           <a:prstGeom prst="line">
@@ -23579,7 +23579,7 @@
         <p:spPr>
           <a:xfrm>
             <a:off x="369888" y="1388775"/>
-            <a:ext cx="11438113" cy="1"/>
+            <a:ext cx="11438112" cy="1"/>
           </a:xfrm>
           <a:prstGeom prst="line">
             <a:avLst/>
@@ -23700,7 +23700,7 @@
         </p:nvSpPr>
         <p:spPr>
           <a:xfrm>
-            <a:off x="10513584" y="6292943"/>
+            <a:off x="10513583" y="6292943"/>
             <a:ext cx="1544260" cy="396241"/>
           </a:xfrm>
           <a:prstGeom prst="rect">
@@ -24259,7 +24259,7 @@
         </p:nvSpPr>
         <p:spPr>
           <a:xfrm>
-            <a:off x="10513584" y="6292943"/>
+            <a:off x="10513583" y="6292943"/>
             <a:ext cx="1544260" cy="396241"/>
           </a:xfrm>
           <a:prstGeom prst="rect">
@@ -24825,7 +24825,7 @@
         </p:nvSpPr>
         <p:spPr>
           <a:xfrm>
-            <a:off x="10513584" y="6292943"/>
+            <a:off x="10513583" y="6292943"/>
             <a:ext cx="1544260" cy="396241"/>
           </a:xfrm>
           <a:prstGeom prst="rect">
@@ -25474,7 +25474,7 @@
         </p:nvSpPr>
         <p:spPr>
           <a:xfrm>
-            <a:off x="10513584" y="6292943"/>
+            <a:off x="10513583" y="6292943"/>
             <a:ext cx="1544260" cy="396241"/>
           </a:xfrm>
           <a:prstGeom prst="rect">
@@ -25992,7 +25992,7 @@
         </p:nvSpPr>
         <p:spPr>
           <a:xfrm>
-            <a:off x="10513584" y="6292943"/>
+            <a:off x="10513583" y="6292943"/>
             <a:ext cx="1544260" cy="396241"/>
           </a:xfrm>
           <a:prstGeom prst="rect">
@@ -26384,7 +26384,7 @@
         </p:nvSpPr>
         <p:spPr>
           <a:xfrm>
-            <a:off x="10513584" y="6292943"/>
+            <a:off x="10513583" y="6292943"/>
             <a:ext cx="1544260" cy="396241"/>
           </a:xfrm>
           <a:prstGeom prst="rect">
@@ -26733,7 +26733,7 @@
         </p:nvSpPr>
         <p:spPr>
           <a:xfrm>
-            <a:off x="10513584" y="6292943"/>
+            <a:off x="10513583" y="6292943"/>
             <a:ext cx="1544260" cy="396241"/>
           </a:xfrm>
           <a:prstGeom prst="rect">
@@ -27172,8 +27172,8 @@
         </p:nvSpPr>
         <p:spPr>
           <a:xfrm>
-            <a:off x="839787" y="2057401"/>
-            <a:ext cx="3932239" cy="3811588"/>
+            <a:off x="839787" y="2057400"/>
+            <a:ext cx="3932238" cy="3811589"/>
           </a:xfrm>
           <a:prstGeom prst="rect">
             <a:avLst/>
@@ -27292,7 +27292,7 @@
         </p:nvSpPr>
         <p:spPr>
           <a:xfrm>
-            <a:off x="10513584" y="6292943"/>
+            <a:off x="10513583" y="6292943"/>
             <a:ext cx="1544260" cy="396241"/>
           </a:xfrm>
           <a:prstGeom prst="rect">
@@ -27811,7 +27811,7 @@
         </p:nvSpPr>
         <p:spPr>
           <a:xfrm>
-            <a:off x="10513584" y="6292943"/>
+            <a:off x="10513583" y="6292943"/>
             <a:ext cx="1544260" cy="396241"/>
           </a:xfrm>
           <a:prstGeom prst="rect">
@@ -28203,7 +28203,7 @@
         </p:nvSpPr>
         <p:spPr>
           <a:xfrm>
-            <a:off x="10513584" y="6292943"/>
+            <a:off x="10513583" y="6292943"/>
             <a:ext cx="1544260" cy="396241"/>
           </a:xfrm>
           <a:prstGeom prst="rect">
@@ -28622,7 +28622,7 @@
         </p:nvSpPr>
         <p:spPr>
           <a:xfrm>
-            <a:off x="10513584" y="6292943"/>
+            <a:off x="10513583" y="6292943"/>
             <a:ext cx="1544260" cy="396241"/>
           </a:xfrm>
           <a:prstGeom prst="rect">
@@ -30384,20 +30384,29 @@
             </a:r>
           </a:p>
           <a:p>
-            <a:pPr>
-              <a:defRPr sz="2400"/>
-            </a:pPr>
-            <a:r>
-              <a:t>Mycket givande möten med er ledare</a:t>
-            </a:r>
-          </a:p>
-          <a:p>
             <a:pPr lvl="1" marL="800100" indent="-342900">
               <a:buChar char="•"/>
               <a:defRPr sz="2400"/>
             </a:pPr>
             <a:r>
-              <a:t>Trots väsensskilda verksamheter: ledarskap är allmängiltigt!</a:t>
+              <a:t>Ekologisk, ekonomisk, social</a:t>
+            </a:r>
+          </a:p>
+          <a:p>
+            <a:pPr>
+              <a:defRPr sz="2400"/>
+            </a:pPr>
+            <a:r>
+              <a:t>Mycket givande möten med er kursledare och deltagare</a:t>
+            </a:r>
+          </a:p>
+          <a:p>
+            <a:pPr lvl="1" marL="800100" indent="-342900">
+              <a:buChar char="•"/>
+              <a:defRPr sz="2400"/>
+            </a:pPr>
+            <a:r>
+              <a:t>Trots väsensskilda verksamheter: ledarskap är allmängiltigt och går att förbättra!</a:t>
             </a:r>
           </a:p>
         </p:txBody>
@@ -31194,8 +31203,8 @@
         </p:nvSpPr>
         <p:spPr>
           <a:xfrm>
-            <a:off x="10114967" y="160927"/>
-            <a:ext cx="972206" cy="300594"/>
+            <a:off x="10114967" y="160926"/>
+            <a:ext cx="972206" cy="300595"/>
           </a:xfrm>
           <a:prstGeom prst="rect">
             <a:avLst/>
@@ -31343,7 +31352,7 @@
         <p:spPr>
           <a:xfrm>
             <a:off x="29526" y="2603332"/>
-            <a:ext cx="3465478" cy="4221089"/>
+            <a:ext cx="3465478" cy="4221090"/>
           </a:xfrm>
           <a:custGeom>
             <a:avLst/>
@@ -32082,7 +32091,7 @@
           </p:nvSpPr>
           <p:spPr>
             <a:xfrm>
-              <a:off x="100600" y="80515"/>
+              <a:off x="100600" y="80516"/>
               <a:ext cx="86832" cy="127001"/>
             </a:xfrm>
             <a:prstGeom prst="rect">
@@ -32186,7 +32195,7 @@
           </p:nvSpPr>
           <p:spPr>
             <a:xfrm>
-              <a:off x="100600" y="80515"/>
+              <a:off x="100600" y="80516"/>
               <a:ext cx="86832" cy="127001"/>
             </a:xfrm>
             <a:prstGeom prst="rect">
@@ -32290,7 +32299,7 @@
           </p:nvSpPr>
           <p:spPr>
             <a:xfrm>
-              <a:off x="100600" y="80515"/>
+              <a:off x="100600" y="80516"/>
               <a:ext cx="86832" cy="127001"/>
             </a:xfrm>
             <a:prstGeom prst="rect">
@@ -32394,7 +32403,7 @@
           </p:nvSpPr>
           <p:spPr>
             <a:xfrm>
-              <a:off x="100600" y="80515"/>
+              <a:off x="100600" y="80516"/>
               <a:ext cx="86832" cy="127001"/>
             </a:xfrm>
             <a:prstGeom prst="rect">
@@ -32498,7 +32507,7 @@
           </p:nvSpPr>
           <p:spPr>
             <a:xfrm>
-              <a:off x="100600" y="80515"/>
+              <a:off x="100600" y="80516"/>
               <a:ext cx="86832" cy="127001"/>
             </a:xfrm>
             <a:prstGeom prst="rect">
@@ -32602,7 +32611,7 @@
           </p:nvSpPr>
           <p:spPr>
             <a:xfrm>
-              <a:off x="100600" y="80515"/>
+              <a:off x="100600" y="80516"/>
               <a:ext cx="86832" cy="127001"/>
             </a:xfrm>
             <a:prstGeom prst="rect">
@@ -32767,7 +32776,7 @@
         <p:spPr>
           <a:xfrm>
             <a:off x="11239590" y="6418202"/>
-            <a:ext cx="856057" cy="313121"/>
+            <a:ext cx="856058" cy="313121"/>
           </a:xfrm>
           <a:prstGeom prst="rect">
             <a:avLst/>
@@ -33087,8 +33096,8 @@
         </p:nvSpPr>
         <p:spPr>
           <a:xfrm>
-            <a:off x="338782" y="3404085"/>
-            <a:ext cx="2548211" cy="1549312"/>
+            <a:off x="338782" y="3404086"/>
+            <a:ext cx="2548211" cy="1549311"/>
           </a:xfrm>
           <a:prstGeom prst="rect">
             <a:avLst/>
@@ -33173,7 +33182,7 @@
         <p:spPr>
           <a:xfrm>
             <a:off x="338782" y="4665753"/>
-            <a:ext cx="2548211" cy="2044612"/>
+            <a:ext cx="2548211" cy="2044611"/>
           </a:xfrm>
           <a:prstGeom prst="rect">
             <a:avLst/>
@@ -33267,8 +33276,8 @@
         </p:nvSpPr>
         <p:spPr>
           <a:xfrm>
-            <a:off x="3621188" y="5583848"/>
-            <a:ext cx="2304949" cy="509400"/>
+            <a:off x="3621187" y="5583849"/>
+            <a:ext cx="2304950" cy="509400"/>
           </a:xfrm>
           <a:prstGeom prst="rect">
             <a:avLst/>
@@ -33307,7 +33316,7 @@
         </p:nvSpPr>
         <p:spPr>
           <a:xfrm>
-            <a:off x="7629509" y="5583848"/>
+            <a:off x="7629509" y="5583849"/>
             <a:ext cx="2304949" cy="280800"/>
           </a:xfrm>
           <a:prstGeom prst="rect">

</xml_diff>

<commit_message>
Små förbättringar igen på examinationsuppgiften
</commit_message>
<xml_diff>
--- a/examination/perh-ledar-A3.pptx
+++ b/examination/perh-ledar-A3.pptx
@@ -30608,47 +30608,73 @@
           <a:bodyPr/>
           <a:lstStyle/>
           <a:p>
-            <a:pPr marL="342900" indent="-342900">
-              <a:defRPr sz="2500"/>
+            <a:pPr marL="339471" indent="-339471" defTabSz="905255">
+              <a:defRPr sz="2475"/>
             </a:pPr>
             <a:r>
               <a:t>Reflekterat</a:t>
             </a:r>
           </a:p>
           <a:p>
-            <a:pPr lvl="1" marL="800100" indent="-342900">
+            <a:pPr lvl="1" marL="792098" indent="-339470" defTabSz="905255">
               <a:buChar char="•"/>
-              <a:defRPr sz="2500"/>
+              <a:defRPr sz="2475"/>
             </a:pPr>
             <a:r>
               <a:t>Dialog om ledarskap med andra utvecklar!</a:t>
             </a:r>
           </a:p>
           <a:p>
-            <a:pPr lvl="1" marL="800100" indent="-342900">
+            <a:pPr lvl="1" marL="792098" indent="-339470" defTabSz="905255">
               <a:buChar char="•"/>
-              <a:defRPr sz="2500"/>
+              <a:defRPr sz="2475"/>
             </a:pPr>
             <a:r>
               <a:t>Ledarskap är allmängiltigt</a:t>
             </a:r>
           </a:p>
           <a:p>
-            <a:pPr lvl="1" marL="800100" indent="-342900">
+            <a:pPr lvl="1" marL="792098" indent="-339470" defTabSz="905255">
               <a:buChar char="•"/>
-              <a:defRPr sz="2500"/>
+              <a:defRPr sz="2475"/>
             </a:pPr>
             <a:r>
               <a:t>Systematisk ledarutveckling behövs och kan göra stor skillnad</a:t>
             </a:r>
           </a:p>
           <a:p>
-            <a:pPr lvl="1" marL="800100" indent="-342900">
+            <a:pPr lvl="1" marL="792098" indent="-339470" defTabSz="905255">
               <a:buChar char="•"/>
-              <a:defRPr sz="2500"/>
+              <a:defRPr sz="2475"/>
             </a:pPr>
             <a:r>
               <a:t>Jag har kunnat associera mitt ledarbeteende och aktiviteter till en modell. Det har gjort mig tryggare i att veta vad jag gör bra och mindre bra och visat vilka vita fläckar jag har</a:t>
+            </a:r>
+          </a:p>
+          <a:p>
+            <a:pPr lvl="1" marL="792098" indent="-339470" defTabSz="905255">
+              <a:buChar char="•"/>
+              <a:defRPr sz="2475"/>
+            </a:pPr>
+            <a:r>
+              <a:t>Mitt ledarskap har blivit roligare med den kunskap kursen gett!</a:t>
+            </a:r>
+          </a:p>
+          <a:p>
+            <a:pPr lvl="2" marL="1244727" indent="-339470" defTabSz="905255">
+              <a:defRPr sz="2475"/>
+            </a:pPr>
+            <a:r>
+              <a:t>Tryggare, har börja jobba med min och andra ledares ledarskapsutveckling</a:t>
+            </a:r>
+          </a:p>
+          <a:p>
+            <a:pPr lvl="1" marL="792098" indent="-339470" defTabSz="905255">
+              <a:buChar char="•"/>
+              <a:defRPr sz="2475"/>
+            </a:pPr>
+            <a:r>
+              <a:t>Väldigt inspirerande med högskolekurs: jag kommer gå fler i framtiden</a:t>
             </a:r>
           </a:p>
         </p:txBody>

</xml_diff>

<commit_message>
Till 1:a mail till Andreas av examinationsuppgiften
</commit_message>
<xml_diff>
--- a/examination/perh-ledar-A3.pptx
+++ b/examination/perh-ledar-A3.pptx
@@ -30705,9 +30705,1038 @@
           <a:chExt cx="0" cy="0"/>
         </a:xfrm>
       </p:grpSpPr>
-      <p:sp>
-        <p:nvSpPr>
-          <p:cNvPr id="1086" name="Min att-göra-lista baserat på lärandet"/>
+      <p:graphicFrame>
+        <p:nvGraphicFramePr>
+          <p:cNvPr id="1086" name="Table 1"/>
+          <p:cNvGraphicFramePr/>
+          <p:nvPr/>
+        </p:nvGraphicFramePr>
+        <p:xfrm>
+          <a:off x="825341" y="1231900"/>
+          <a:ext cx="10985501" cy="5323831"/>
+        </p:xfrm>
+        <a:graphic xmlns:a="http://schemas.openxmlformats.org/drawingml/2006/main">
+          <a:graphicData uri="http://schemas.openxmlformats.org/drawingml/2006/table">
+            <a:tbl>
+              <a:tblPr firstCol="0" firstRow="1" lastCol="0" lastRow="0" bandCol="0" bandRow="1" rtl="0">
+                <a:tableStyleId>{4C3C2611-4C71-4FC5-86AE-919BDF0F9419}</a:tableStyleId>
+              </a:tblPr>
+              <a:tblGrid>
+                <a:gridCol w="2338876"/>
+                <a:gridCol w="2379571"/>
+                <a:gridCol w="1039819"/>
+                <a:gridCol w="2304831"/>
+                <a:gridCol w="2909701"/>
+              </a:tblGrid>
+              <a:tr h="192161">
+                <a:tc>
+                  <a:txBody>
+                    <a:bodyPr/>
+                    <a:lstStyle/>
+                    <a:p>
+                      <a:pPr marL="25400" algn="l">
+                        <a:lnSpc>
+                          <a:spcPct val="80000"/>
+                        </a:lnSpc>
+                        <a:spcBef>
+                          <a:spcPts val="500"/>
+                        </a:spcBef>
+                        <a:defRPr b="0" sz="1800">
+                          <a:solidFill>
+                            <a:srgbClr val="000000"/>
+                          </a:solidFill>
+                        </a:defRPr>
+                      </a:pPr>
+                      <a:r>
+                        <a:rPr b="1" sz="1300">
+                          <a:solidFill>
+                            <a:srgbClr val="FFFFFF"/>
+                          </a:solidFill>
+                        </a:rPr>
+                        <a:t>Vad</a:t>
+                      </a:r>
+                    </a:p>
+                  </a:txBody>
+                  <a:tcPr marL="0" marR="0" marT="0" marB="0" anchor="ctr" anchorCtr="0" horzOverflow="overflow">
+                    <a:lnL w="12700">
+                      <a:solidFill>
+                        <a:srgbClr val="FFFFFF"/>
+                      </a:solidFill>
+                      <a:miter lim="400000"/>
+                    </a:lnL>
+                    <a:lnT w="12700">
+                      <a:solidFill>
+                        <a:srgbClr val="FFFFFF"/>
+                      </a:solidFill>
+                      <a:miter lim="400000"/>
+                    </a:lnT>
+                  </a:tcPr>
+                </a:tc>
+                <a:tc>
+                  <a:txBody>
+                    <a:bodyPr/>
+                    <a:lstStyle/>
+                    <a:p>
+                      <a:pPr marL="25400" algn="l">
+                        <a:lnSpc>
+                          <a:spcPct val="80000"/>
+                        </a:lnSpc>
+                        <a:spcBef>
+                          <a:spcPts val="500"/>
+                        </a:spcBef>
+                        <a:defRPr b="0" sz="1800">
+                          <a:solidFill>
+                            <a:srgbClr val="000000"/>
+                          </a:solidFill>
+                        </a:defRPr>
+                      </a:pPr>
+                      <a:r>
+                        <a:rPr b="1" sz="1300">
+                          <a:solidFill>
+                            <a:srgbClr val="FFFFFF"/>
+                          </a:solidFill>
+                        </a:rPr>
+                        <a:t>Varför</a:t>
+                      </a:r>
+                    </a:p>
+                  </a:txBody>
+                  <a:tcPr marL="0" marR="0" marT="0" marB="0" anchor="ctr" anchorCtr="0" horzOverflow="overflow">
+                    <a:lnT w="12700">
+                      <a:solidFill>
+                        <a:srgbClr val="FFFFFF"/>
+                      </a:solidFill>
+                      <a:miter lim="400000"/>
+                    </a:lnT>
+                  </a:tcPr>
+                </a:tc>
+                <a:tc>
+                  <a:txBody>
+                    <a:bodyPr/>
+                    <a:lstStyle/>
+                    <a:p>
+                      <a:pPr marL="25400" algn="l">
+                        <a:lnSpc>
+                          <a:spcPct val="80000"/>
+                        </a:lnSpc>
+                        <a:spcBef>
+                          <a:spcPts val="500"/>
+                        </a:spcBef>
+                        <a:defRPr b="0" sz="1800">
+                          <a:solidFill>
+                            <a:srgbClr val="000000"/>
+                          </a:solidFill>
+                        </a:defRPr>
+                      </a:pPr>
+                      <a:r>
+                        <a:rPr b="1" sz="1300">
+                          <a:solidFill>
+                            <a:srgbClr val="FFFFFF"/>
+                          </a:solidFill>
+                        </a:rPr>
+                        <a:t>När</a:t>
+                      </a:r>
+                    </a:p>
+                  </a:txBody>
+                  <a:tcPr marL="0" marR="0" marT="0" marB="0" anchor="ctr" anchorCtr="0" horzOverflow="overflow">
+                    <a:lnT w="12700">
+                      <a:solidFill>
+                        <a:srgbClr val="FFFFFF"/>
+                      </a:solidFill>
+                      <a:miter lim="400000"/>
+                    </a:lnT>
+                  </a:tcPr>
+                </a:tc>
+                <a:tc>
+                  <a:txBody>
+                    <a:bodyPr/>
+                    <a:lstStyle/>
+                    <a:p>
+                      <a:pPr marL="25400" algn="l">
+                        <a:lnSpc>
+                          <a:spcPct val="80000"/>
+                        </a:lnSpc>
+                        <a:spcBef>
+                          <a:spcPts val="500"/>
+                        </a:spcBef>
+                        <a:defRPr b="0" sz="1800">
+                          <a:solidFill>
+                            <a:srgbClr val="000000"/>
+                          </a:solidFill>
+                        </a:defRPr>
+                      </a:pPr>
+                      <a:r>
+                        <a:rPr b="1" sz="1300">
+                          <a:solidFill>
+                            <a:srgbClr val="FFFFFF"/>
+                          </a:solidFill>
+                        </a:rPr>
+                        <a:t>Mandat</a:t>
+                      </a:r>
+                    </a:p>
+                  </a:txBody>
+                  <a:tcPr marL="0" marR="0" marT="0" marB="0" anchor="ctr" anchorCtr="0" horzOverflow="overflow">
+                    <a:lnT w="12700">
+                      <a:solidFill>
+                        <a:srgbClr val="FFFFFF"/>
+                      </a:solidFill>
+                      <a:miter lim="400000"/>
+                    </a:lnT>
+                  </a:tcPr>
+                </a:tc>
+                <a:tc>
+                  <a:txBody>
+                    <a:bodyPr/>
+                    <a:lstStyle/>
+                    <a:p>
+                      <a:pPr marL="25400" algn="l">
+                        <a:lnSpc>
+                          <a:spcPct val="80000"/>
+                        </a:lnSpc>
+                        <a:spcBef>
+                          <a:spcPts val="500"/>
+                        </a:spcBef>
+                        <a:defRPr b="0" sz="1800">
+                          <a:solidFill>
+                            <a:srgbClr val="000000"/>
+                          </a:solidFill>
+                        </a:defRPr>
+                      </a:pPr>
+                      <a:r>
+                        <a:rPr b="1" sz="1300">
+                          <a:solidFill>
+                            <a:srgbClr val="FFFFFF"/>
+                          </a:solidFill>
+                        </a:rPr>
+                        <a:t>Uppföljning</a:t>
+                      </a:r>
+                    </a:p>
+                  </a:txBody>
+                  <a:tcPr marL="0" marR="0" marT="0" marB="0" anchor="ctr" anchorCtr="0" horzOverflow="overflow">
+                    <a:lnR w="12700">
+                      <a:solidFill>
+                        <a:srgbClr val="FFFFFF"/>
+                      </a:solidFill>
+                      <a:miter lim="400000"/>
+                    </a:lnR>
+                    <a:lnT w="12700">
+                      <a:solidFill>
+                        <a:srgbClr val="FFFFFF"/>
+                      </a:solidFill>
+                      <a:miter lim="400000"/>
+                    </a:lnT>
+                  </a:tcPr>
+                </a:tc>
+              </a:tr>
+              <a:tr h="801761">
+                <a:tc>
+                  <a:txBody>
+                    <a:bodyPr/>
+                    <a:lstStyle/>
+                    <a:p>
+                      <a:pPr marL="25400" algn="l">
+                        <a:lnSpc>
+                          <a:spcPct val="80000"/>
+                        </a:lnSpc>
+                        <a:spcBef>
+                          <a:spcPts val="500"/>
+                        </a:spcBef>
+                        <a:defRPr sz="1800"/>
+                      </a:pPr>
+                      <a:r>
+                        <a:rPr sz="1300"/>
+                        <a:t>Färdigställ idévalsmatris för teamet</a:t>
+                      </a:r>
+                    </a:p>
+                  </a:txBody>
+                  <a:tcPr marL="0" marR="0" marT="0" marB="0" anchor="ctr" anchorCtr="0" horzOverflow="overflow">
+                    <a:lnL w="12700">
+                      <a:solidFill>
+                        <a:srgbClr val="FFFFFF"/>
+                      </a:solidFill>
+                      <a:miter lim="400000"/>
+                    </a:lnL>
+                  </a:tcPr>
+                </a:tc>
+                <a:tc>
+                  <a:txBody>
+                    <a:bodyPr/>
+                    <a:lstStyle/>
+                    <a:p>
+                      <a:pPr marL="25400" algn="l">
+                        <a:lnSpc>
+                          <a:spcPct val="80000"/>
+                        </a:lnSpc>
+                        <a:spcBef>
+                          <a:spcPts val="500"/>
+                        </a:spcBef>
+                        <a:defRPr sz="1800"/>
+                      </a:pPr>
+                      <a:r>
+                        <a:rPr sz="1300"/>
+                        <a:t>Tydliggör bättre alla delar i PDCA för teamet. För närvarande fokuserar vi nästan uteslutande på Do</a:t>
+                      </a:r>
+                    </a:p>
+                  </a:txBody>
+                  <a:tcPr marL="0" marR="0" marT="0" marB="0" anchor="ctr" anchorCtr="0" horzOverflow="overflow"/>
+                </a:tc>
+                <a:tc>
+                  <a:txBody>
+                    <a:bodyPr/>
+                    <a:lstStyle/>
+                    <a:p>
+                      <a:pPr marL="25400" algn="l">
+                        <a:lnSpc>
+                          <a:spcPct val="80000"/>
+                        </a:lnSpc>
+                        <a:spcBef>
+                          <a:spcPts val="500"/>
+                        </a:spcBef>
+                        <a:defRPr sz="1800"/>
+                      </a:pPr>
+                      <a:r>
+                        <a:rPr sz="1300"/>
+                        <a:t>v.49 2024</a:t>
+                      </a:r>
+                    </a:p>
+                  </a:txBody>
+                  <a:tcPr marL="0" marR="0" marT="0" marB="0" anchor="ctr" anchorCtr="0" horzOverflow="overflow"/>
+                </a:tc>
+                <a:tc>
+                  <a:txBody>
+                    <a:bodyPr/>
+                    <a:lstStyle/>
+                    <a:p>
+                      <a:pPr marL="25400" algn="l">
+                        <a:lnSpc>
+                          <a:spcPct val="80000"/>
+                        </a:lnSpc>
+                        <a:spcBef>
+                          <a:spcPts val="500"/>
+                        </a:spcBef>
+                        <a:defRPr sz="1800"/>
+                      </a:pPr>
+                      <a:r>
+                        <a:rPr sz="1300"/>
+                        <a:t>Mitt ansvar och mandat i egenskap av Team lead</a:t>
+                      </a:r>
+                    </a:p>
+                  </a:txBody>
+                  <a:tcPr marL="0" marR="0" marT="0" marB="0" anchor="ctr" anchorCtr="0" horzOverflow="overflow"/>
+                </a:tc>
+                <a:tc>
+                  <a:txBody>
+                    <a:bodyPr/>
+                    <a:lstStyle/>
+                    <a:p>
+                      <a:pPr marL="25400" algn="l">
+                        <a:lnSpc>
+                          <a:spcPct val="80000"/>
+                        </a:lnSpc>
+                        <a:spcBef>
+                          <a:spcPts val="500"/>
+                        </a:spcBef>
+                        <a:defRPr sz="1800"/>
+                      </a:pPr>
+                      <a:r>
+                        <a:rPr sz="1300"/>
+                        <a:t>På nästa efterkommande retrospektiv med teamet, som hålls max. 4 veckor senare</a:t>
+                      </a:r>
+                    </a:p>
+                  </a:txBody>
+                  <a:tcPr marL="0" marR="0" marT="0" marB="0" anchor="ctr" anchorCtr="0" horzOverflow="overflow">
+                    <a:lnR w="12700">
+                      <a:solidFill>
+                        <a:srgbClr val="FFFFFF"/>
+                      </a:solidFill>
+                      <a:miter lim="400000"/>
+                    </a:lnR>
+                  </a:tcPr>
+                </a:tc>
+              </a:tr>
+              <a:tr h="789061">
+                <a:tc>
+                  <a:txBody>
+                    <a:bodyPr/>
+                    <a:lstStyle/>
+                    <a:p>
+                      <a:pPr marL="25400" algn="l">
+                        <a:lnSpc>
+                          <a:spcPct val="80000"/>
+                        </a:lnSpc>
+                        <a:spcBef>
+                          <a:spcPts val="500"/>
+                        </a:spcBef>
+                        <a:defRPr sz="1800"/>
+                      </a:pPr>
+                      <a:r>
+                        <a:rPr sz="1300"/>
+                        <a:t>Genomför grundorsaksanalys för de områden som har låga resultat i medarbetarenkät</a:t>
+                      </a:r>
+                    </a:p>
+                  </a:txBody>
+                  <a:tcPr marL="0" marR="0" marT="0" marB="0" anchor="ctr" anchorCtr="0" horzOverflow="overflow">
+                    <a:lnL w="12700">
+                      <a:solidFill>
+                        <a:srgbClr val="FFFFFF"/>
+                      </a:solidFill>
+                      <a:miter lim="400000"/>
+                    </a:lnL>
+                  </a:tcPr>
+                </a:tc>
+                <a:tc>
+                  <a:txBody>
+                    <a:bodyPr/>
+                    <a:lstStyle/>
+                    <a:p>
+                      <a:pPr marL="25400" algn="l">
+                        <a:lnSpc>
+                          <a:spcPct val="80000"/>
+                        </a:lnSpc>
+                        <a:spcBef>
+                          <a:spcPts val="500"/>
+                        </a:spcBef>
+                        <a:defRPr sz="1800"/>
+                      </a:pPr>
+                      <a:r>
+                        <a:rPr sz="1300"/>
+                        <a:t>Ledningen vill bättre förstå de dåliga enkätresultaten, för att kunna prioritera och genomföra nödvändiga förändringar</a:t>
+                      </a:r>
+                    </a:p>
+                  </a:txBody>
+                  <a:tcPr marL="0" marR="0" marT="0" marB="0" anchor="ctr" anchorCtr="0" horzOverflow="overflow"/>
+                </a:tc>
+                <a:tc>
+                  <a:txBody>
+                    <a:bodyPr/>
+                    <a:lstStyle/>
+                    <a:p>
+                      <a:pPr marL="25400" algn="l">
+                        <a:lnSpc>
+                          <a:spcPct val="80000"/>
+                        </a:lnSpc>
+                        <a:spcBef>
+                          <a:spcPts val="500"/>
+                        </a:spcBef>
+                        <a:defRPr sz="1800"/>
+                      </a:pPr>
+                      <a:r>
+                        <a:rPr sz="1300"/>
+                        <a:t>v.50 2024</a:t>
+                      </a:r>
+                    </a:p>
+                  </a:txBody>
+                  <a:tcPr marL="0" marR="0" marT="0" marB="0" anchor="ctr" anchorCtr="0" horzOverflow="overflow"/>
+                </a:tc>
+                <a:tc>
+                  <a:txBody>
+                    <a:bodyPr/>
+                    <a:lstStyle/>
+                    <a:p>
+                      <a:pPr marL="25400" algn="l">
+                        <a:lnSpc>
+                          <a:spcPct val="80000"/>
+                        </a:lnSpc>
+                        <a:spcBef>
+                          <a:spcPts val="500"/>
+                        </a:spcBef>
+                        <a:defRPr sz="1800"/>
+                      </a:pPr>
+                      <a:r>
+                        <a:rPr sz="1300"/>
+                        <a:t>Delegerat ansvar från min chef</a:t>
+                      </a:r>
+                    </a:p>
+                  </a:txBody>
+                  <a:tcPr marL="0" marR="0" marT="0" marB="0" anchor="ctr" anchorCtr="0" horzOverflow="overflow"/>
+                </a:tc>
+                <a:tc>
+                  <a:txBody>
+                    <a:bodyPr/>
+                    <a:lstStyle/>
+                    <a:p>
+                      <a:pPr marL="25400" algn="l">
+                        <a:lnSpc>
+                          <a:spcPct val="80000"/>
+                        </a:lnSpc>
+                        <a:spcBef>
+                          <a:spcPts val="500"/>
+                        </a:spcBef>
+                        <a:defRPr sz="1800"/>
+                      </a:pPr>
+                      <a:r>
+                        <a:rPr sz="1300"/>
+                        <a:t>December 2024 på möte som min chef sammankallar</a:t>
+                      </a:r>
+                    </a:p>
+                  </a:txBody>
+                  <a:tcPr marL="0" marR="0" marT="0" marB="0" anchor="ctr" anchorCtr="0" horzOverflow="overflow">
+                    <a:lnR w="12700">
+                      <a:solidFill>
+                        <a:srgbClr val="FFFFFF"/>
+                      </a:solidFill>
+                      <a:miter lim="400000"/>
+                    </a:lnR>
+                  </a:tcPr>
+                </a:tc>
+              </a:tr>
+              <a:tr h="585861">
+                <a:tc>
+                  <a:txBody>
+                    <a:bodyPr/>
+                    <a:lstStyle/>
+                    <a:p>
+                      <a:pPr marL="25400" algn="l">
+                        <a:lnSpc>
+                          <a:spcPct val="80000"/>
+                        </a:lnSpc>
+                        <a:spcBef>
+                          <a:spcPts val="500"/>
+                        </a:spcBef>
+                        <a:defRPr sz="1800"/>
+                      </a:pPr>
+                      <a:r>
+                        <a:rPr sz="1300"/>
+                        <a:t>Boka in egen reflektionstid, 0.5 h/vecka</a:t>
+                      </a:r>
+                    </a:p>
+                  </a:txBody>
+                  <a:tcPr marL="0" marR="0" marT="0" marB="0" anchor="ctr" anchorCtr="0" horzOverflow="overflow">
+                    <a:lnL w="12700">
+                      <a:solidFill>
+                        <a:srgbClr val="FFFFFF"/>
+                      </a:solidFill>
+                      <a:miter lim="400000"/>
+                    </a:lnL>
+                  </a:tcPr>
+                </a:tc>
+                <a:tc>
+                  <a:txBody>
+                    <a:bodyPr/>
+                    <a:lstStyle/>
+                    <a:p>
+                      <a:pPr marL="25400" algn="l">
+                        <a:lnSpc>
+                          <a:spcPct val="80000"/>
+                        </a:lnSpc>
+                        <a:spcBef>
+                          <a:spcPts val="500"/>
+                        </a:spcBef>
+                        <a:defRPr sz="1800"/>
+                      </a:pPr>
+                      <a:r>
+                        <a:rPr sz="1300"/>
+                        <a:t>Skapar uthållighet i mitt eget förbättringsarbete och lärande</a:t>
+                      </a:r>
+                    </a:p>
+                  </a:txBody>
+                  <a:tcPr marL="0" marR="0" marT="0" marB="0" anchor="ctr" anchorCtr="0" horzOverflow="overflow"/>
+                </a:tc>
+                <a:tc>
+                  <a:txBody>
+                    <a:bodyPr/>
+                    <a:lstStyle/>
+                    <a:p>
+                      <a:pPr marL="25400" algn="l">
+                        <a:lnSpc>
+                          <a:spcPct val="80000"/>
+                        </a:lnSpc>
+                        <a:spcBef>
+                          <a:spcPts val="500"/>
+                        </a:spcBef>
+                        <a:defRPr sz="1800"/>
+                      </a:pPr>
+                      <a:r>
+                        <a:rPr sz="1300"/>
+                        <a:t>v.48 2024</a:t>
+                      </a:r>
+                    </a:p>
+                  </a:txBody>
+                  <a:tcPr marL="0" marR="0" marT="0" marB="0" anchor="ctr" anchorCtr="0" horzOverflow="overflow"/>
+                </a:tc>
+                <a:tc>
+                  <a:txBody>
+                    <a:bodyPr/>
+                    <a:lstStyle/>
+                    <a:p>
+                      <a:pPr marL="25400" algn="l">
+                        <a:lnSpc>
+                          <a:spcPct val="80000"/>
+                        </a:lnSpc>
+                        <a:spcBef>
+                          <a:spcPts val="500"/>
+                        </a:spcBef>
+                        <a:defRPr sz="1800"/>
+                      </a:pPr>
+                      <a:r>
+                        <a:rPr sz="1300"/>
+                        <a:t>Mitt eget</a:t>
+                      </a:r>
+                    </a:p>
+                  </a:txBody>
+                  <a:tcPr marL="0" marR="0" marT="0" marB="0" anchor="ctr" anchorCtr="0" horzOverflow="overflow"/>
+                </a:tc>
+                <a:tc>
+                  <a:txBody>
+                    <a:bodyPr/>
+                    <a:lstStyle/>
+                    <a:p>
+                      <a:pPr marL="25400" algn="l">
+                        <a:lnSpc>
+                          <a:spcPct val="80000"/>
+                        </a:lnSpc>
+                        <a:spcBef>
+                          <a:spcPts val="500"/>
+                        </a:spcBef>
+                        <a:defRPr sz="1800"/>
+                      </a:pPr>
+                      <a:r>
+                        <a:rPr sz="1300"/>
+                        <a:t>Veckovis, vid de bokade tillfällena</a:t>
+                      </a:r>
+                    </a:p>
+                  </a:txBody>
+                  <a:tcPr marL="0" marR="0" marT="0" marB="0" anchor="ctr" anchorCtr="0" horzOverflow="overflow">
+                    <a:lnR w="12700">
+                      <a:solidFill>
+                        <a:srgbClr val="FFFFFF"/>
+                      </a:solidFill>
+                      <a:miter lim="400000"/>
+                    </a:lnR>
+                  </a:tcPr>
+                </a:tc>
+              </a:tr>
+              <a:tr h="992261">
+                <a:tc>
+                  <a:txBody>
+                    <a:bodyPr/>
+                    <a:lstStyle/>
+                    <a:p>
+                      <a:pPr marL="25400" algn="l">
+                        <a:lnSpc>
+                          <a:spcPct val="80000"/>
+                        </a:lnSpc>
+                        <a:spcBef>
+                          <a:spcPts val="500"/>
+                        </a:spcBef>
+                        <a:defRPr sz="1800"/>
+                      </a:pPr>
+                      <a:r>
+                        <a:rPr sz="1300"/>
+                        <a:t>Synliggör mig själv mer: jobba aktivt med att minska min “Fasad” i Joharis fönster </a:t>
+                      </a:r>
+                    </a:p>
+                  </a:txBody>
+                  <a:tcPr marL="0" marR="0" marT="0" marB="0" anchor="ctr" anchorCtr="0" horzOverflow="overflow">
+                    <a:lnL w="12700">
+                      <a:solidFill>
+                        <a:srgbClr val="FFFFFF"/>
+                      </a:solidFill>
+                      <a:miter lim="400000"/>
+                    </a:lnL>
+                  </a:tcPr>
+                </a:tc>
+                <a:tc>
+                  <a:txBody>
+                    <a:bodyPr/>
+                    <a:lstStyle/>
+                    <a:p>
+                      <a:pPr marL="25400" algn="l">
+                        <a:lnSpc>
+                          <a:spcPct val="80000"/>
+                        </a:lnSpc>
+                        <a:spcBef>
+                          <a:spcPts val="500"/>
+                        </a:spcBef>
+                        <a:defRPr sz="1800"/>
+                      </a:pPr>
+                      <a:r>
+                        <a:rPr sz="1300"/>
+                        <a:t>Det bidrar till bättre förutsättningar för tillit</a:t>
+                      </a:r>
+                    </a:p>
+                  </a:txBody>
+                  <a:tcPr marL="0" marR="0" marT="0" marB="0" anchor="ctr" anchorCtr="0" horzOverflow="overflow"/>
+                </a:tc>
+                <a:tc>
+                  <a:txBody>
+                    <a:bodyPr/>
+                    <a:lstStyle/>
+                    <a:p>
+                      <a:pPr marL="25400" algn="l">
+                        <a:lnSpc>
+                          <a:spcPct val="80000"/>
+                        </a:lnSpc>
+                        <a:spcBef>
+                          <a:spcPts val="500"/>
+                        </a:spcBef>
+                        <a:defRPr sz="1800"/>
+                      </a:pPr>
+                      <a:r>
+                        <a:rPr sz="1300"/>
+                        <a:t>v.48 2024</a:t>
+                      </a:r>
+                    </a:p>
+                  </a:txBody>
+                  <a:tcPr marL="0" marR="0" marT="0" marB="0" anchor="ctr" anchorCtr="0" horzOverflow="overflow"/>
+                </a:tc>
+                <a:tc>
+                  <a:txBody>
+                    <a:bodyPr/>
+                    <a:lstStyle/>
+                    <a:p>
+                      <a:pPr marL="25400" algn="l">
+                        <a:lnSpc>
+                          <a:spcPct val="80000"/>
+                        </a:lnSpc>
+                        <a:spcBef>
+                          <a:spcPts val="500"/>
+                        </a:spcBef>
+                        <a:defRPr sz="1800"/>
+                      </a:pPr>
+                      <a:r>
+                        <a:rPr sz="1300"/>
+                        <a:t>Mitt eget</a:t>
+                      </a:r>
+                    </a:p>
+                  </a:txBody>
+                  <a:tcPr marL="0" marR="0" marT="0" marB="0" anchor="ctr" anchorCtr="0" horzOverflow="overflow"/>
+                </a:tc>
+                <a:tc>
+                  <a:txBody>
+                    <a:bodyPr/>
+                    <a:lstStyle/>
+                    <a:p>
+                      <a:pPr marL="25400" algn="l">
+                        <a:lnSpc>
+                          <a:spcPct val="80000"/>
+                        </a:lnSpc>
+                        <a:spcBef>
+                          <a:spcPts val="500"/>
+                        </a:spcBef>
+                        <a:defRPr sz="1800"/>
+                      </a:pPr>
+                      <a:r>
+                        <a:rPr sz="1300"/>
+                        <a:t>Veckovis under egen reflektionstid, se föregående punkt</a:t>
+                      </a:r>
+                    </a:p>
+                  </a:txBody>
+                  <a:tcPr marL="0" marR="0" marT="0" marB="0" anchor="ctr" anchorCtr="0" horzOverflow="overflow">
+                    <a:lnR w="12700">
+                      <a:solidFill>
+                        <a:srgbClr val="FFFFFF"/>
+                      </a:solidFill>
+                      <a:miter lim="400000"/>
+                    </a:lnR>
+                  </a:tcPr>
+                </a:tc>
+              </a:tr>
+              <a:tr h="992261">
+                <a:tc>
+                  <a:txBody>
+                    <a:bodyPr/>
+                    <a:lstStyle/>
+                    <a:p>
+                      <a:pPr marL="25400" algn="l">
+                        <a:lnSpc>
+                          <a:spcPct val="80000"/>
+                        </a:lnSpc>
+                        <a:spcBef>
+                          <a:spcPts val="500"/>
+                        </a:spcBef>
+                        <a:defRPr sz="1800"/>
+                      </a:pPr>
+                      <a:r>
+                        <a:rPr sz="1300"/>
+                        <a:t>Genomför bokklubb Ledarstegen med utvecklingschefer, från 1:a linjen till två nivåer upp i hierarkin. 8 -10 tillfällen
+</a:t>
+                      </a:r>
+                    </a:p>
+                  </a:txBody>
+                  <a:tcPr marL="0" marR="0" marT="0" marB="0" anchor="ctr" anchorCtr="0" horzOverflow="overflow">
+                    <a:lnL w="12700">
+                      <a:solidFill>
+                        <a:srgbClr val="FFFFFF"/>
+                      </a:solidFill>
+                      <a:miter lim="400000"/>
+                    </a:lnL>
+                  </a:tcPr>
+                </a:tc>
+                <a:tc>
+                  <a:txBody>
+                    <a:bodyPr/>
+                    <a:lstStyle/>
+                    <a:p>
+                      <a:pPr marL="25400" algn="l">
+                        <a:lnSpc>
+                          <a:spcPct val="80000"/>
+                        </a:lnSpc>
+                        <a:spcBef>
+                          <a:spcPts val="500"/>
+                        </a:spcBef>
+                        <a:defRPr sz="1800"/>
+                      </a:pPr>
+                      <a:r>
+                        <a:rPr sz="1300"/>
+                        <a:t>Det finns en önskan om mer ledarutbildning i organisationen. Syftet är att vi utvecklar ledarskapet, får en gemensam referens och lär känna varandra</a:t>
+                      </a:r>
+                    </a:p>
+                  </a:txBody>
+                  <a:tcPr marL="0" marR="0" marT="0" marB="0" anchor="ctr" anchorCtr="0" horzOverflow="overflow"/>
+                </a:tc>
+                <a:tc>
+                  <a:txBody>
+                    <a:bodyPr/>
+                    <a:lstStyle/>
+                    <a:p>
+                      <a:pPr marL="25400" algn="l">
+                        <a:lnSpc>
+                          <a:spcPct val="80000"/>
+                        </a:lnSpc>
+                        <a:spcBef>
+                          <a:spcPts val="500"/>
+                        </a:spcBef>
+                        <a:defRPr sz="1800"/>
+                      </a:pPr>
+                      <a:r>
+                        <a:rPr sz="1300"/>
+                        <a:t>v.47 2024 - Januari 2025</a:t>
+                      </a:r>
+                    </a:p>
+                  </a:txBody>
+                  <a:tcPr marL="0" marR="0" marT="0" marB="0" anchor="ctr" anchorCtr="0" horzOverflow="overflow"/>
+                </a:tc>
+                <a:tc>
+                  <a:txBody>
+                    <a:bodyPr/>
+                    <a:lstStyle/>
+                    <a:p>
+                      <a:pPr marL="25400" algn="l">
+                        <a:lnSpc>
+                          <a:spcPct val="80000"/>
+                        </a:lnSpc>
+                        <a:spcBef>
+                          <a:spcPts val="500"/>
+                        </a:spcBef>
+                        <a:defRPr sz="1800"/>
+                      </a:pPr>
+                      <a:r>
+                        <a:rPr sz="1300"/>
+                        <a:t>Mandat från avdelningens teknikchef, som själv deltar i utbildningen</a:t>
+                      </a:r>
+                    </a:p>
+                  </a:txBody>
+                  <a:tcPr marL="0" marR="0" marT="0" marB="0" anchor="ctr" anchorCtr="0" horzOverflow="overflow"/>
+                </a:tc>
+                <a:tc>
+                  <a:txBody>
+                    <a:bodyPr/>
+                    <a:lstStyle/>
+                    <a:p>
+                      <a:pPr marL="25400" algn="l">
+                        <a:lnSpc>
+                          <a:spcPct val="80000"/>
+                        </a:lnSpc>
+                        <a:spcBef>
+                          <a:spcPts val="500"/>
+                        </a:spcBef>
+                        <a:defRPr sz="1800"/>
+                      </a:pPr>
+                      <a:r>
+                        <a:rPr sz="1300"/>
+                        <a:t>Vid varje kurstillfälle och särskild uppföljning vid sista</a:t>
+                      </a:r>
+                    </a:p>
+                  </a:txBody>
+                  <a:tcPr marL="0" marR="0" marT="0" marB="0" anchor="ctr" anchorCtr="0" horzOverflow="overflow">
+                    <a:lnR w="12700">
+                      <a:solidFill>
+                        <a:srgbClr val="FFFFFF"/>
+                      </a:solidFill>
+                      <a:miter lim="400000"/>
+                    </a:lnR>
+                  </a:tcPr>
+                </a:tc>
+              </a:tr>
+              <a:tr h="1195461">
+                <a:tc>
+                  <a:txBody>
+                    <a:bodyPr/>
+                    <a:lstStyle/>
+                    <a:p>
+                      <a:pPr marL="25400" algn="l">
+                        <a:lnSpc>
+                          <a:spcPct val="80000"/>
+                        </a:lnSpc>
+                        <a:spcBef>
+                          <a:spcPts val="500"/>
+                        </a:spcBef>
+                        <a:defRPr sz="1300"/>
+                      </a:pPr>
+                      <a:r>
+                        <a:t>Ta fram version 2 av Team agreement för min grupp enligt metod beskriven i</a:t>
+                      </a:r>
+                      <a:r>
+                        <a:rPr u="sng">
+                          <a:solidFill>
+                            <a:srgbClr val="0000FF"/>
+                          </a:solidFill>
+                          <a:uFill>
+                            <a:solidFill>
+                              <a:srgbClr val="0000FF"/>
+                            </a:solidFill>
+                          </a:uFill>
+                          <a:hlinkClick r:id="rId2" invalidUrl="" action="" tgtFrame="" tooltip="" history="1" highlightClick="0" endSnd="0"/>
+                        </a:rPr>
+                        <a:t> Bootstrapping a Working Agreement for the Agile Team</a:t>
+                      </a:r>
+                    </a:p>
+                  </a:txBody>
+                  <a:tcPr marL="0" marR="0" marT="0" marB="0" anchor="ctr" anchorCtr="0" horzOverflow="overflow">
+                    <a:lnL w="12700">
+                      <a:solidFill>
+                        <a:srgbClr val="FFFFFF"/>
+                      </a:solidFill>
+                      <a:miter lim="400000"/>
+                    </a:lnL>
+                    <a:lnB w="12700">
+                      <a:solidFill>
+                        <a:srgbClr val="FFFFFF"/>
+                      </a:solidFill>
+                      <a:miter lim="400000"/>
+                    </a:lnB>
+                  </a:tcPr>
+                </a:tc>
+                <a:tc>
+                  <a:txBody>
+                    <a:bodyPr/>
+                    <a:lstStyle/>
+                    <a:p>
+                      <a:pPr marL="25400" algn="l">
+                        <a:lnSpc>
+                          <a:spcPct val="80000"/>
+                        </a:lnSpc>
+                        <a:spcBef>
+                          <a:spcPts val="500"/>
+                        </a:spcBef>
+                        <a:defRPr sz="1800"/>
+                      </a:pPr>
+                      <a:r>
+                        <a:rPr sz="1300"/>
+                        <a:t>Det bidrar till att bygga laget och att skapa samsyn om vilka förväntningar vi har på varandra. Efter att version 1 togs fram har vi haft en del personalomsättning</a:t>
+                      </a:r>
+                    </a:p>
+                  </a:txBody>
+                  <a:tcPr marL="0" marR="0" marT="0" marB="0" anchor="ctr" anchorCtr="0" horzOverflow="overflow">
+                    <a:lnB w="12700">
+                      <a:solidFill>
+                        <a:srgbClr val="FFFFFF"/>
+                      </a:solidFill>
+                      <a:miter lim="400000"/>
+                    </a:lnB>
+                  </a:tcPr>
+                </a:tc>
+                <a:tc>
+                  <a:txBody>
+                    <a:bodyPr/>
+                    <a:lstStyle/>
+                    <a:p>
+                      <a:pPr marL="25400" algn="l">
+                        <a:lnSpc>
+                          <a:spcPct val="80000"/>
+                        </a:lnSpc>
+                        <a:spcBef>
+                          <a:spcPts val="500"/>
+                        </a:spcBef>
+                        <a:defRPr sz="1800"/>
+                      </a:pPr>
+                      <a:r>
+                        <a:rPr sz="1300"/>
+                        <a:t>v.49 2024</a:t>
+                      </a:r>
+                    </a:p>
+                  </a:txBody>
+                  <a:tcPr marL="0" marR="0" marT="0" marB="0" anchor="ctr" anchorCtr="0" horzOverflow="overflow">
+                    <a:lnB w="12700">
+                      <a:solidFill>
+                        <a:srgbClr val="FFFFFF"/>
+                      </a:solidFill>
+                      <a:miter lim="400000"/>
+                    </a:lnB>
+                  </a:tcPr>
+                </a:tc>
+                <a:tc>
+                  <a:txBody>
+                    <a:bodyPr/>
+                    <a:lstStyle/>
+                    <a:p>
+                      <a:pPr marL="25400" algn="l">
+                        <a:lnSpc>
+                          <a:spcPct val="80000"/>
+                        </a:lnSpc>
+                        <a:spcBef>
+                          <a:spcPts val="500"/>
+                        </a:spcBef>
+                        <a:defRPr sz="1800"/>
+                      </a:pPr>
+                      <a:r>
+                        <a:rPr sz="1300"/>
+                        <a:t>Mitt ansvar och mandat i egenskap av Team lead</a:t>
+                      </a:r>
+                    </a:p>
+                  </a:txBody>
+                  <a:tcPr marL="0" marR="0" marT="0" marB="0" anchor="ctr" anchorCtr="0" horzOverflow="overflow">
+                    <a:lnB w="12700">
+                      <a:solidFill>
+                        <a:srgbClr val="FFFFFF"/>
+                      </a:solidFill>
+                      <a:miter lim="400000"/>
+                    </a:lnB>
+                  </a:tcPr>
+                </a:tc>
+                <a:tc>
+                  <a:txBody>
+                    <a:bodyPr/>
+                    <a:lstStyle/>
+                    <a:p>
+                      <a:pPr marL="25400" algn="l">
+                        <a:lnSpc>
+                          <a:spcPct val="80000"/>
+                        </a:lnSpc>
+                        <a:spcBef>
+                          <a:spcPts val="500"/>
+                        </a:spcBef>
+                        <a:defRPr sz="1800"/>
+                      </a:pPr>
+                      <a:r>
+                        <a:rPr sz="1300"/>
+                        <a:t>Löpande efter att vi kommit överens om version 2, fram till att vi tar fram version 3</a:t>
+                      </a:r>
+                    </a:p>
+                  </a:txBody>
+                  <a:tcPr marL="0" marR="0" marT="0" marB="0" anchor="ctr" anchorCtr="0" horzOverflow="overflow">
+                    <a:lnR w="12700">
+                      <a:solidFill>
+                        <a:srgbClr val="FFFFFF"/>
+                      </a:solidFill>
+                      <a:miter lim="400000"/>
+                    </a:lnR>
+                    <a:lnB w="12700">
+                      <a:solidFill>
+                        <a:srgbClr val="FFFFFF"/>
+                      </a:solidFill>
+                      <a:miter lim="400000"/>
+                    </a:lnB>
+                  </a:tcPr>
+                </a:tc>
+              </a:tr>
+            </a:tbl>
+          </a:graphicData>
+        </a:graphic>
+      </p:graphicFrame>
+      <p:sp>
+        <p:nvSpPr>
+          <p:cNvPr id="1087" name="Min att-göra-lista baserat på lärandet"/>
           <p:cNvSpPr txBox="1"/>
           <p:nvPr>
             <p:ph type="title"/>
@@ -30725,56 +31754,6 @@
             <a:pPr/>
             <a:r>
               <a:t>Min att-göra-lista baserat på lärandet</a:t>
-            </a:r>
-          </a:p>
-        </p:txBody>
-      </p:sp>
-      <p:sp>
-        <p:nvSpPr>
-          <p:cNvPr id="1087" name="Synliggör mig själv mer: jobba aktivt med att minska min “Fasad” i Joharis fönster…"/>
-          <p:cNvSpPr txBox="1"/>
-          <p:nvPr>
-            <p:ph type="body" idx="1"/>
-          </p:nvPr>
-        </p:nvSpPr>
-        <p:spPr>
-          <a:prstGeom prst="rect">
-            <a:avLst/>
-          </a:prstGeom>
-        </p:spPr>
-        <p:txBody>
-          <a:bodyPr/>
-          <a:lstStyle/>
-          <a:p>
-            <a:pPr marL="342900" indent="-342900">
-              <a:defRPr sz="2500"/>
-            </a:pPr>
-            <a:r>
-              <a:t>Synliggör mig själv mer: jobba aktivt med att minska min “Fasad” i Joharis fönster </a:t>
-            </a:r>
-          </a:p>
-          <a:p>
-            <a:pPr marL="342900" indent="-342900">
-              <a:defRPr sz="2500"/>
-            </a:pPr>
-            <a:r>
-              <a:t>Färdigställ påbörjad förbättringstavla</a:t>
-            </a:r>
-          </a:p>
-          <a:p>
-            <a:pPr marL="342900" indent="-342900">
-              <a:defRPr sz="2500"/>
-            </a:pPr>
-            <a:r>
-              <a:t>Genomför grundorsaksanalys för de områden som har låga resultat i medarbetarenkät</a:t>
-            </a:r>
-          </a:p>
-          <a:p>
-            <a:pPr marL="342900" indent="-342900">
-              <a:defRPr sz="2500"/>
-            </a:pPr>
-            <a:r>
-              <a:t>Ta med vad jag lärt till arbete med “Team agreement” om ett par veckor</a:t>
             </a:r>
           </a:p>
         </p:txBody>
@@ -33296,14 +34275,14 @@
       </p:sp>
       <p:sp>
         <p:nvSpPr>
-          <p:cNvPr id="1136" name="Vi har mycket att göra just nu i teamet"/>
+          <p:cNvPr id="1136" name="Vi har mycket att göra just nu i teamet…"/>
           <p:cNvSpPr txBox="1"/>
           <p:nvPr/>
         </p:nvSpPr>
         <p:spPr>
           <a:xfrm>
             <a:off x="3621187" y="5583849"/>
-            <a:ext cx="2304950" cy="509400"/>
+            <a:ext cx="2304950" cy="966600"/>
           </a:xfrm>
           <a:prstGeom prst="rect">
             <a:avLst/>
@@ -33321,29 +34300,40 @@
           <a:bodyPr lIns="45719" rIns="45719">
             <a:spAutoFit/>
           </a:bodyPr>
-          <a:lstStyle>
-            <a:lvl1pPr>
+          <a:lstStyle/>
+          <a:p>
+            <a:pPr>
               <a:defRPr sz="1400"/>
-            </a:lvl1pPr>
-          </a:lstStyle>
-          <a:p>
-            <a:pPr/>
+            </a:pPr>
             <a:r>
               <a:t>Vi har mycket att göra just nu i teamet</a:t>
             </a:r>
           </a:p>
-        </p:txBody>
-      </p:sp>
-      <p:sp>
-        <p:nvSpPr>
-          <p:cNvPr id="1137" name="Prioritera ner annat"/>
+          <a:p>
+            <a:pPr>
+              <a:defRPr sz="1400"/>
+            </a:pPr>
+          </a:p>
+          <a:p>
+            <a:pPr>
+              <a:defRPr sz="1400"/>
+            </a:pPr>
+            <a:r>
+              <a:t>Jag ska byta jobb i februari</a:t>
+            </a:r>
+          </a:p>
+        </p:txBody>
+      </p:sp>
+      <p:sp>
+        <p:nvSpPr>
+          <p:cNvPr id="1137" name="Prioritera ner annat…"/>
           <p:cNvSpPr txBox="1"/>
           <p:nvPr/>
         </p:nvSpPr>
         <p:spPr>
           <a:xfrm>
             <a:off x="7629509" y="5583849"/>
-            <a:ext cx="2304949" cy="280800"/>
+            <a:ext cx="2304949" cy="966600"/>
           </a:xfrm>
           <a:prstGeom prst="rect">
             <a:avLst/>
@@ -33361,15 +34351,26 @@
           <a:bodyPr lIns="45719" rIns="45719">
             <a:spAutoFit/>
           </a:bodyPr>
-          <a:lstStyle>
-            <a:lvl1pPr>
+          <a:lstStyle/>
+          <a:p>
+            <a:pPr>
               <a:defRPr sz="1400"/>
-            </a:lvl1pPr>
-          </a:lstStyle>
-          <a:p>
-            <a:pPr/>
+            </a:pPr>
             <a:r>
               <a:t>Prioritera ner annat</a:t>
+            </a:r>
+          </a:p>
+          <a:p>
+            <a:pPr>
+              <a:defRPr sz="1400"/>
+            </a:pPr>
+          </a:p>
+          <a:p>
+            <a:pPr>
+              <a:defRPr sz="1400"/>
+            </a:pPr>
+            <a:r>
+              <a:t>Fortsätt med ovanstående på nya jobbet</a:t>
             </a:r>
           </a:p>
         </p:txBody>

</xml_diff>

<commit_message>
Tillägg till 1:a mail till Andreas av examinationsuppgiften
</commit_message>
<xml_diff>
--- a/examination/perh-ledar-A3.pptx
+++ b/examination/perh-ledar-A3.pptx
@@ -30336,7 +30336,7 @@
       </p:sp>
       <p:sp>
         <p:nvSpPr>
-          <p:cNvPr id="1078" name="Kursen har gett en modell och terminologi för ledarskap som passar mig…"/>
+          <p:cNvPr id="1078" name="Kursen har gett en bra referensmodell för ledarskap som passar mig:…"/>
           <p:cNvSpPr txBox="1"/>
           <p:nvPr>
             <p:ph type="body" idx="1"/>
@@ -30355,15 +30355,7 @@
               <a:defRPr sz="2400"/>
             </a:pPr>
             <a:r>
-              <a:t>Kursen har gett en modell och terminologi för ledarskap som passar mig</a:t>
-            </a:r>
-          </a:p>
-          <a:p>
-            <a:pPr>
-              <a:defRPr sz="2400"/>
-            </a:pPr>
-            <a:r>
-              <a:t>Större verktygslåda:</a:t>
+              <a:t>Kursen har gett en bra referensmodell för ledarskap som passar mig:</a:t>
             </a:r>
           </a:p>
           <a:p>
@@ -30372,15 +30364,7 @@
               <a:defRPr sz="2400"/>
             </a:pPr>
             <a:r>
-              <a:t>FFA är vad vi gör på jobbet, SCARF för motivationsfaktorer, +QTE för bra mål, PDCA för ständiga förbättringar. Och mycket annat!</a:t>
-            </a:r>
-          </a:p>
-          <a:p>
-            <a:pPr>
-              <a:defRPr sz="2400"/>
-            </a:pPr>
-            <a:r>
-              <a:t>Hållbarhet på flera plan har tydliggjorts på ett bra sätt</a:t>
+              <a:t>Visualiserad modell</a:t>
             </a:r>
           </a:p>
           <a:p>
@@ -30389,7 +30373,7 @@
               <a:defRPr sz="2400"/>
             </a:pPr>
             <a:r>
-              <a:t>Ekologisk, ekonomisk, social</a:t>
+              <a:t>Definierade termer och begrepp</a:t>
             </a:r>
           </a:p>
           <a:p>
@@ -30397,7 +30381,41 @@
               <a:defRPr sz="2400"/>
             </a:pPr>
             <a:r>
-              <a:t>Mycket givande möten med er kursledare och deltagare</a:t>
+              <a:t>Den har gett många nya användbara verktyg i verktygslådan:</a:t>
+            </a:r>
+          </a:p>
+          <a:p>
+            <a:pPr lvl="1" marL="800100" indent="-342900">
+              <a:buChar char="•"/>
+              <a:defRPr sz="2400"/>
+            </a:pPr>
+            <a:r>
+              <a:t>FFA är vad vi gör på jobbet, SCARF för motivationsfaktorer, +QTE för bra mål, PDCA för ständiga förbättringar. Och mycket annat!</a:t>
+            </a:r>
+          </a:p>
+          <a:p>
+            <a:pPr>
+              <a:defRPr sz="2400"/>
+            </a:pPr>
+            <a:r>
+              <a:t>Hållbarhet på flera plan har tydliggjorts på ett bra sätt:</a:t>
+            </a:r>
+          </a:p>
+          <a:p>
+            <a:pPr lvl="1" marL="800100" indent="-342900">
+              <a:buChar char="•"/>
+              <a:defRPr sz="2400"/>
+            </a:pPr>
+            <a:r>
+              <a:t>Ekologisk, ekonomisk, social</a:t>
+            </a:r>
+          </a:p>
+          <a:p>
+            <a:pPr>
+              <a:defRPr sz="2400"/>
+            </a:pPr>
+            <a:r>
+              <a:t>Mycket givande möten med kursledare och deltagare</a:t>
             </a:r>
           </a:p>
           <a:p>
@@ -30518,7 +30536,7 @@
               <a:defRPr sz="2500"/>
             </a:pPr>
             <a:r>
-              <a:t>“Något som överraskat er?” för att upptäcka avvikelser</a:t>
+              <a:t>Ställer frågan “Något som överraskat er?” för att upptäcka avvikelser</a:t>
             </a:r>
           </a:p>
           <a:p>
@@ -30536,7 +30554,15 @@
               <a:defRPr sz="2500"/>
             </a:pPr>
             <a:r>
-              <a:t>Jag startar bokcirkel Ledarstegen på torsdag</a:t>
+              <a:t>Jag har startat en bokcirkel där vi läser Ledarstegen</a:t>
+            </a:r>
+          </a:p>
+          <a:p>
+            <a:pPr lvl="2" marL="1257300" indent="-342900">
+              <a:defRPr sz="2500"/>
+            </a:pPr>
+            <a:r>
+              <a:t>Åtta utvecklingschefer i min organisation deltar</a:t>
             </a:r>
           </a:p>
         </p:txBody>
@@ -30648,7 +30674,7 @@
               <a:defRPr sz="2475"/>
             </a:pPr>
             <a:r>
-              <a:t>Jag har kunnat associera mitt ledarbeteende och aktiviteter till en modell. Det har gjort mig tryggare i att veta vad jag gör bra och mindre bra och visat vilka vita fläckar jag har</a:t>
+              <a:t>Jag har kunnat associera mitt ledarbeteende och aktiviteter till en modell. Det har gjort mig tryggare i att veta vad jag gör bra och mindre bra och visat vilka vita fläckar jag har kunskapsmässigt</a:t>
             </a:r>
           </a:p>
           <a:p>
@@ -30657,7 +30683,7 @@
               <a:defRPr sz="2475"/>
             </a:pPr>
             <a:r>
-              <a:t>Mitt ledarskap har blivit roligare med den kunskap kursen gett!</a:t>
+              <a:t>Mitt ledarskap har blivit roligare med den kunskap  och de insikter kursen gett!</a:t>
             </a:r>
           </a:p>
           <a:p>
@@ -31351,7 +31377,7 @@
                       </a:pPr>
                       <a:r>
                         <a:rPr sz="1300"/>
-                        <a:t>Det bidrar till bättre förutsättningar för tillit</a:t>
+                        <a:t>Jag bidrar till bättre förutsättningar för tillit i samarbetet med andra</a:t>
                       </a:r>
                     </a:p>
                   </a:txBody>

</xml_diff>